<commit_message>
all is done, except text for example 14.
</commit_message>
<xml_diff>
--- a/presentations/example10.pptx
+++ b/presentations/example10.pptx
@@ -5,9 +5,11 @@
     <p:sldMasterId id="2147483648" r:id="rId1"/>
   </p:sldMasterIdLst>
   <p:sldIdLst>
-    <p:sldId id="259" r:id="rId2"/>
-    <p:sldId id="257" r:id="rId3"/>
-    <p:sldId id="258" r:id="rId4"/>
+    <p:sldId id="257" r:id="rId2"/>
+    <p:sldId id="258" r:id="rId3"/>
+    <p:sldId id="259" r:id="rId4"/>
+    <p:sldId id="260" r:id="rId5"/>
+    <p:sldId id="261" r:id="rId6"/>
   </p:sldIdLst>
   <p:sldSz cx="12192000" cy="6858000"/>
   <p:notesSz cx="6858000" cy="9144000"/>
@@ -241,9 +243,9 @@
           <a:bodyPr/>
           <a:lstStyle/>
           <a:p>
-            <a:fld id="{936431B8-415A-460F-8061-F0F39B5985BC}" type="datetimeFigureOut">
+            <a:fld id="{74A6B15C-ADB0-4957-B33F-4CF21949A72A}" type="datetimeFigureOut">
               <a:rPr lang="en-US" smtClean="0"/>
-              <a:t>5/8/2021</a:t>
+              <a:t>5/10/2021</a:t>
             </a:fld>
             <a:endParaRPr lang="en-US"/>
           </a:p>
@@ -283,7 +285,7 @@
           <a:bodyPr/>
           <a:lstStyle/>
           <a:p>
-            <a:fld id="{754B16AD-88D1-4DE5-A412-43594C2A365F}" type="slidenum">
+            <a:fld id="{A982C6C7-0552-4040-A3D6-3C62EF181577}" type="slidenum">
               <a:rPr lang="en-US" smtClean="0"/>
               <a:t>‹#›</a:t>
             </a:fld>
@@ -294,7 +296,7 @@
     </p:spTree>
     <p:extLst>
       <p:ext uri="{BB962C8B-B14F-4D97-AF65-F5344CB8AC3E}">
-        <p14:creationId xmlns:p14="http://schemas.microsoft.com/office/powerpoint/2010/main" val="1397719816"/>
+        <p14:creationId xmlns:p14="http://schemas.microsoft.com/office/powerpoint/2010/main" val="961711603"/>
       </p:ext>
     </p:extLst>
   </p:cSld>
@@ -409,9 +411,9 @@
           <a:bodyPr/>
           <a:lstStyle/>
           <a:p>
-            <a:fld id="{936431B8-415A-460F-8061-F0F39B5985BC}" type="datetimeFigureOut">
+            <a:fld id="{74A6B15C-ADB0-4957-B33F-4CF21949A72A}" type="datetimeFigureOut">
               <a:rPr lang="en-US" smtClean="0"/>
-              <a:t>5/8/2021</a:t>
+              <a:t>5/10/2021</a:t>
             </a:fld>
             <a:endParaRPr lang="en-US"/>
           </a:p>
@@ -451,7 +453,7 @@
           <a:bodyPr/>
           <a:lstStyle/>
           <a:p>
-            <a:fld id="{754B16AD-88D1-4DE5-A412-43594C2A365F}" type="slidenum">
+            <a:fld id="{A982C6C7-0552-4040-A3D6-3C62EF181577}" type="slidenum">
               <a:rPr lang="en-US" smtClean="0"/>
               <a:t>‹#›</a:t>
             </a:fld>
@@ -462,7 +464,7 @@
     </p:spTree>
     <p:extLst>
       <p:ext uri="{BB962C8B-B14F-4D97-AF65-F5344CB8AC3E}">
-        <p14:creationId xmlns:p14="http://schemas.microsoft.com/office/powerpoint/2010/main" val="3576447936"/>
+        <p14:creationId xmlns:p14="http://schemas.microsoft.com/office/powerpoint/2010/main" val="2716814438"/>
       </p:ext>
     </p:extLst>
   </p:cSld>
@@ -587,9 +589,9 @@
           <a:bodyPr/>
           <a:lstStyle/>
           <a:p>
-            <a:fld id="{936431B8-415A-460F-8061-F0F39B5985BC}" type="datetimeFigureOut">
+            <a:fld id="{74A6B15C-ADB0-4957-B33F-4CF21949A72A}" type="datetimeFigureOut">
               <a:rPr lang="en-US" smtClean="0"/>
-              <a:t>5/8/2021</a:t>
+              <a:t>5/10/2021</a:t>
             </a:fld>
             <a:endParaRPr lang="en-US"/>
           </a:p>
@@ -629,7 +631,7 @@
           <a:bodyPr/>
           <a:lstStyle/>
           <a:p>
-            <a:fld id="{754B16AD-88D1-4DE5-A412-43594C2A365F}" type="slidenum">
+            <a:fld id="{A982C6C7-0552-4040-A3D6-3C62EF181577}" type="slidenum">
               <a:rPr lang="en-US" smtClean="0"/>
               <a:t>‹#›</a:t>
             </a:fld>
@@ -640,7 +642,7 @@
     </p:spTree>
     <p:extLst>
       <p:ext uri="{BB962C8B-B14F-4D97-AF65-F5344CB8AC3E}">
-        <p14:creationId xmlns:p14="http://schemas.microsoft.com/office/powerpoint/2010/main" val="3313870604"/>
+        <p14:creationId xmlns:p14="http://schemas.microsoft.com/office/powerpoint/2010/main" val="2044131380"/>
       </p:ext>
     </p:extLst>
   </p:cSld>
@@ -755,9 +757,9 @@
           <a:bodyPr/>
           <a:lstStyle/>
           <a:p>
-            <a:fld id="{936431B8-415A-460F-8061-F0F39B5985BC}" type="datetimeFigureOut">
+            <a:fld id="{74A6B15C-ADB0-4957-B33F-4CF21949A72A}" type="datetimeFigureOut">
               <a:rPr lang="en-US" smtClean="0"/>
-              <a:t>5/8/2021</a:t>
+              <a:t>5/10/2021</a:t>
             </a:fld>
             <a:endParaRPr lang="en-US"/>
           </a:p>
@@ -797,7 +799,7 @@
           <a:bodyPr/>
           <a:lstStyle/>
           <a:p>
-            <a:fld id="{754B16AD-88D1-4DE5-A412-43594C2A365F}" type="slidenum">
+            <a:fld id="{A982C6C7-0552-4040-A3D6-3C62EF181577}" type="slidenum">
               <a:rPr lang="en-US" smtClean="0"/>
               <a:t>‹#›</a:t>
             </a:fld>
@@ -808,7 +810,7 @@
     </p:spTree>
     <p:extLst>
       <p:ext uri="{BB962C8B-B14F-4D97-AF65-F5344CB8AC3E}">
-        <p14:creationId xmlns:p14="http://schemas.microsoft.com/office/powerpoint/2010/main" val="52571984"/>
+        <p14:creationId xmlns:p14="http://schemas.microsoft.com/office/powerpoint/2010/main" val="1636283185"/>
       </p:ext>
     </p:extLst>
   </p:cSld>
@@ -1000,9 +1002,9 @@
           <a:bodyPr/>
           <a:lstStyle/>
           <a:p>
-            <a:fld id="{936431B8-415A-460F-8061-F0F39B5985BC}" type="datetimeFigureOut">
+            <a:fld id="{74A6B15C-ADB0-4957-B33F-4CF21949A72A}" type="datetimeFigureOut">
               <a:rPr lang="en-US" smtClean="0"/>
-              <a:t>5/8/2021</a:t>
+              <a:t>5/10/2021</a:t>
             </a:fld>
             <a:endParaRPr lang="en-US"/>
           </a:p>
@@ -1042,7 +1044,7 @@
           <a:bodyPr/>
           <a:lstStyle/>
           <a:p>
-            <a:fld id="{754B16AD-88D1-4DE5-A412-43594C2A365F}" type="slidenum">
+            <a:fld id="{A982C6C7-0552-4040-A3D6-3C62EF181577}" type="slidenum">
               <a:rPr lang="en-US" smtClean="0"/>
               <a:t>‹#›</a:t>
             </a:fld>
@@ -1053,7 +1055,7 @@
     </p:spTree>
     <p:extLst>
       <p:ext uri="{BB962C8B-B14F-4D97-AF65-F5344CB8AC3E}">
-        <p14:creationId xmlns:p14="http://schemas.microsoft.com/office/powerpoint/2010/main" val="3552793053"/>
+        <p14:creationId xmlns:p14="http://schemas.microsoft.com/office/powerpoint/2010/main" val="631484094"/>
       </p:ext>
     </p:extLst>
   </p:cSld>
@@ -1229,9 +1231,9 @@
           <a:bodyPr/>
           <a:lstStyle/>
           <a:p>
-            <a:fld id="{936431B8-415A-460F-8061-F0F39B5985BC}" type="datetimeFigureOut">
+            <a:fld id="{74A6B15C-ADB0-4957-B33F-4CF21949A72A}" type="datetimeFigureOut">
               <a:rPr lang="en-US" smtClean="0"/>
-              <a:t>5/8/2021</a:t>
+              <a:t>5/10/2021</a:t>
             </a:fld>
             <a:endParaRPr lang="en-US"/>
           </a:p>
@@ -1271,7 +1273,7 @@
           <a:bodyPr/>
           <a:lstStyle/>
           <a:p>
-            <a:fld id="{754B16AD-88D1-4DE5-A412-43594C2A365F}" type="slidenum">
+            <a:fld id="{A982C6C7-0552-4040-A3D6-3C62EF181577}" type="slidenum">
               <a:rPr lang="en-US" smtClean="0"/>
               <a:t>‹#›</a:t>
             </a:fld>
@@ -1282,7 +1284,7 @@
     </p:spTree>
     <p:extLst>
       <p:ext uri="{BB962C8B-B14F-4D97-AF65-F5344CB8AC3E}">
-        <p14:creationId xmlns:p14="http://schemas.microsoft.com/office/powerpoint/2010/main" val="3508839733"/>
+        <p14:creationId xmlns:p14="http://schemas.microsoft.com/office/powerpoint/2010/main" val="2081512124"/>
       </p:ext>
     </p:extLst>
   </p:cSld>
@@ -1593,9 +1595,9 @@
           <a:bodyPr/>
           <a:lstStyle/>
           <a:p>
-            <a:fld id="{936431B8-415A-460F-8061-F0F39B5985BC}" type="datetimeFigureOut">
+            <a:fld id="{74A6B15C-ADB0-4957-B33F-4CF21949A72A}" type="datetimeFigureOut">
               <a:rPr lang="en-US" smtClean="0"/>
-              <a:t>5/8/2021</a:t>
+              <a:t>5/10/2021</a:t>
             </a:fld>
             <a:endParaRPr lang="en-US"/>
           </a:p>
@@ -1635,7 +1637,7 @@
           <a:bodyPr/>
           <a:lstStyle/>
           <a:p>
-            <a:fld id="{754B16AD-88D1-4DE5-A412-43594C2A365F}" type="slidenum">
+            <a:fld id="{A982C6C7-0552-4040-A3D6-3C62EF181577}" type="slidenum">
               <a:rPr lang="en-US" smtClean="0"/>
               <a:t>‹#›</a:t>
             </a:fld>
@@ -1646,7 +1648,7 @@
     </p:spTree>
     <p:extLst>
       <p:ext uri="{BB962C8B-B14F-4D97-AF65-F5344CB8AC3E}">
-        <p14:creationId xmlns:p14="http://schemas.microsoft.com/office/powerpoint/2010/main" val="3739361062"/>
+        <p14:creationId xmlns:p14="http://schemas.microsoft.com/office/powerpoint/2010/main" val="4168497592"/>
       </p:ext>
     </p:extLst>
   </p:cSld>
@@ -1710,9 +1712,9 @@
           <a:bodyPr/>
           <a:lstStyle/>
           <a:p>
-            <a:fld id="{936431B8-415A-460F-8061-F0F39B5985BC}" type="datetimeFigureOut">
+            <a:fld id="{74A6B15C-ADB0-4957-B33F-4CF21949A72A}" type="datetimeFigureOut">
               <a:rPr lang="en-US" smtClean="0"/>
-              <a:t>5/8/2021</a:t>
+              <a:t>5/10/2021</a:t>
             </a:fld>
             <a:endParaRPr lang="en-US"/>
           </a:p>
@@ -1752,7 +1754,7 @@
           <a:bodyPr/>
           <a:lstStyle/>
           <a:p>
-            <a:fld id="{754B16AD-88D1-4DE5-A412-43594C2A365F}" type="slidenum">
+            <a:fld id="{A982C6C7-0552-4040-A3D6-3C62EF181577}" type="slidenum">
               <a:rPr lang="en-US" smtClean="0"/>
               <a:t>‹#›</a:t>
             </a:fld>
@@ -1763,7 +1765,7 @@
     </p:spTree>
     <p:extLst>
       <p:ext uri="{BB962C8B-B14F-4D97-AF65-F5344CB8AC3E}">
-        <p14:creationId xmlns:p14="http://schemas.microsoft.com/office/powerpoint/2010/main" val="483103545"/>
+        <p14:creationId xmlns:p14="http://schemas.microsoft.com/office/powerpoint/2010/main" val="1814120607"/>
       </p:ext>
     </p:extLst>
   </p:cSld>
@@ -1805,9 +1807,9 @@
           <a:bodyPr/>
           <a:lstStyle/>
           <a:p>
-            <a:fld id="{936431B8-415A-460F-8061-F0F39B5985BC}" type="datetimeFigureOut">
+            <a:fld id="{74A6B15C-ADB0-4957-B33F-4CF21949A72A}" type="datetimeFigureOut">
               <a:rPr lang="en-US" smtClean="0"/>
-              <a:t>5/8/2021</a:t>
+              <a:t>5/10/2021</a:t>
             </a:fld>
             <a:endParaRPr lang="en-US"/>
           </a:p>
@@ -1847,7 +1849,7 @@
           <a:bodyPr/>
           <a:lstStyle/>
           <a:p>
-            <a:fld id="{754B16AD-88D1-4DE5-A412-43594C2A365F}" type="slidenum">
+            <a:fld id="{A982C6C7-0552-4040-A3D6-3C62EF181577}" type="slidenum">
               <a:rPr lang="en-US" smtClean="0"/>
               <a:t>‹#›</a:t>
             </a:fld>
@@ -1858,7 +1860,7 @@
     </p:spTree>
     <p:extLst>
       <p:ext uri="{BB962C8B-B14F-4D97-AF65-F5344CB8AC3E}">
-        <p14:creationId xmlns:p14="http://schemas.microsoft.com/office/powerpoint/2010/main" val="2887467953"/>
+        <p14:creationId xmlns:p14="http://schemas.microsoft.com/office/powerpoint/2010/main" val="3978413592"/>
       </p:ext>
     </p:extLst>
   </p:cSld>
@@ -2080,9 +2082,9 @@
           <a:bodyPr/>
           <a:lstStyle/>
           <a:p>
-            <a:fld id="{936431B8-415A-460F-8061-F0F39B5985BC}" type="datetimeFigureOut">
+            <a:fld id="{74A6B15C-ADB0-4957-B33F-4CF21949A72A}" type="datetimeFigureOut">
               <a:rPr lang="en-US" smtClean="0"/>
-              <a:t>5/8/2021</a:t>
+              <a:t>5/10/2021</a:t>
             </a:fld>
             <a:endParaRPr lang="en-US"/>
           </a:p>
@@ -2122,7 +2124,7 @@
           <a:bodyPr/>
           <a:lstStyle/>
           <a:p>
-            <a:fld id="{754B16AD-88D1-4DE5-A412-43594C2A365F}" type="slidenum">
+            <a:fld id="{A982C6C7-0552-4040-A3D6-3C62EF181577}" type="slidenum">
               <a:rPr lang="en-US" smtClean="0"/>
               <a:t>‹#›</a:t>
             </a:fld>
@@ -2133,7 +2135,7 @@
     </p:spTree>
     <p:extLst>
       <p:ext uri="{BB962C8B-B14F-4D97-AF65-F5344CB8AC3E}">
-        <p14:creationId xmlns:p14="http://schemas.microsoft.com/office/powerpoint/2010/main" val="3497284699"/>
+        <p14:creationId xmlns:p14="http://schemas.microsoft.com/office/powerpoint/2010/main" val="2563759391"/>
       </p:ext>
     </p:extLst>
   </p:cSld>
@@ -2332,9 +2334,9 @@
           <a:bodyPr/>
           <a:lstStyle/>
           <a:p>
-            <a:fld id="{936431B8-415A-460F-8061-F0F39B5985BC}" type="datetimeFigureOut">
+            <a:fld id="{74A6B15C-ADB0-4957-B33F-4CF21949A72A}" type="datetimeFigureOut">
               <a:rPr lang="en-US" smtClean="0"/>
-              <a:t>5/8/2021</a:t>
+              <a:t>5/10/2021</a:t>
             </a:fld>
             <a:endParaRPr lang="en-US"/>
           </a:p>
@@ -2374,7 +2376,7 @@
           <a:bodyPr/>
           <a:lstStyle/>
           <a:p>
-            <a:fld id="{754B16AD-88D1-4DE5-A412-43594C2A365F}" type="slidenum">
+            <a:fld id="{A982C6C7-0552-4040-A3D6-3C62EF181577}" type="slidenum">
               <a:rPr lang="en-US" smtClean="0"/>
               <a:t>‹#›</a:t>
             </a:fld>
@@ -2385,7 +2387,7 @@
     </p:spTree>
     <p:extLst>
       <p:ext uri="{BB962C8B-B14F-4D97-AF65-F5344CB8AC3E}">
-        <p14:creationId xmlns:p14="http://schemas.microsoft.com/office/powerpoint/2010/main" val="1536965296"/>
+        <p14:creationId xmlns:p14="http://schemas.microsoft.com/office/powerpoint/2010/main" val="2382070244"/>
       </p:ext>
     </p:extLst>
   </p:cSld>
@@ -2543,9 +2545,9 @@
             </a:lvl1pPr>
           </a:lstStyle>
           <a:p>
-            <a:fld id="{936431B8-415A-460F-8061-F0F39B5985BC}" type="datetimeFigureOut">
+            <a:fld id="{74A6B15C-ADB0-4957-B33F-4CF21949A72A}" type="datetimeFigureOut">
               <a:rPr lang="en-US" smtClean="0"/>
-              <a:t>5/8/2021</a:t>
+              <a:t>5/10/2021</a:t>
             </a:fld>
             <a:endParaRPr lang="en-US"/>
           </a:p>
@@ -2621,7 +2623,7 @@
             </a:lvl1pPr>
           </a:lstStyle>
           <a:p>
-            <a:fld id="{754B16AD-88D1-4DE5-A412-43594C2A365F}" type="slidenum">
+            <a:fld id="{A982C6C7-0552-4040-A3D6-3C62EF181577}" type="slidenum">
               <a:rPr lang="en-US" smtClean="0"/>
               <a:t>‹#›</a:t>
             </a:fld>
@@ -2632,7 +2634,7 @@
     </p:spTree>
     <p:extLst>
       <p:ext uri="{BB962C8B-B14F-4D97-AF65-F5344CB8AC3E}">
-        <p14:creationId xmlns:p14="http://schemas.microsoft.com/office/powerpoint/2010/main" val="839902544"/>
+        <p14:creationId xmlns:p14="http://schemas.microsoft.com/office/powerpoint/2010/main" val="124684329"/>
       </p:ext>
     </p:extLst>
   </p:cSld>
@@ -2966,74 +2968,122 @@
           <a:lstStyle/>
           <a:p>
             <a:r>
-              <a:rPr lang="ru-RU" dirty="0"/>
-              <a:t>Внедрение зависимостей(</a:t>
-            </a:r>
+              <a:rPr lang="en-US" dirty="0" err="1"/>
+              <a:t>Autowiring</a:t>
+            </a:r>
+            <a:r>
+              <a:rPr lang="en-US" dirty="0"/>
+              <a:t> - </a:t>
+            </a:r>
+            <a:r>
+              <a:rPr lang="ru-RU" dirty="0"/>
+              <a:t>автоматическое связывание.</a:t>
+            </a:r>
+            <a:endParaRPr lang="en-US" dirty="0"/>
+          </a:p>
+        </p:txBody>
+      </p:sp>
+      <p:sp>
+        <p:nvSpPr>
+          <p:cNvPr id="3" name="Content Placeholder 2"/>
+          <p:cNvSpPr>
+            <a:spLocks noGrp="1"/>
+          </p:cNvSpPr>
+          <p:nvPr>
+            <p:ph idx="1"/>
+          </p:nvPr>
+        </p:nvSpPr>
+        <p:spPr>
+          <a:xfrm>
+            <a:off x="838200" y="1690688"/>
+            <a:ext cx="10515600" cy="4351338"/>
+          </a:xfrm>
+        </p:spPr>
+        <p:txBody>
+          <a:bodyPr>
+            <a:normAutofit/>
+          </a:bodyPr>
+          <a:lstStyle/>
+          <a:p>
+            <a:pPr marL="0" indent="0">
+              <a:buNone/>
+            </a:pPr>
             <a:r>
               <a:rPr lang="ru-RU" dirty="0" err="1"/>
-              <a:t>Dependency</a:t>
-            </a:r>
-            <a:r>
-              <a:rPr lang="ru-RU" dirty="0"/>
-              <a:t> </a:t>
+              <a:t>Спринг</a:t>
+            </a:r>
+            <a:r>
+              <a:rPr lang="ru-RU" dirty="0"/>
+              <a:t> способен определять и добавлять зависимости автоматически, что может значительно уменьшить объём конфигураций(написанного кода), но в то же время делает </a:t>
+            </a:r>
+            <a:r>
+              <a:rPr lang="ru-RU" dirty="0" smtClean="0"/>
+              <a:t>затруднительнее </a:t>
+            </a:r>
+            <a:r>
+              <a:rPr lang="ru-RU" dirty="0"/>
+              <a:t>чтение и проверку зависимостей.</a:t>
+            </a:r>
+          </a:p>
+          <a:p>
+            <a:pPr marL="0" indent="0">
+              <a:buNone/>
+            </a:pPr>
+            <a:r>
+              <a:rPr lang="ru-RU" dirty="0"/>
+              <a:t>Существует три типа </a:t>
             </a:r>
             <a:r>
               <a:rPr lang="ru-RU" dirty="0" err="1"/>
-              <a:t>injection</a:t>
-            </a:r>
-            <a:r>
-              <a:rPr lang="ru-RU" dirty="0"/>
-              <a:t>) через конструктор.</a:t>
-            </a:r>
-            <a:endParaRPr lang="en-US" dirty="0"/>
-          </a:p>
-        </p:txBody>
-      </p:sp>
-      <p:sp>
-        <p:nvSpPr>
-          <p:cNvPr id="3" name="Content Placeholder 2"/>
-          <p:cNvSpPr>
-            <a:spLocks noGrp="1"/>
-          </p:cNvSpPr>
-          <p:nvPr>
-            <p:ph idx="1"/>
-          </p:nvPr>
-        </p:nvSpPr>
-        <p:spPr/>
-        <p:txBody>
-          <a:bodyPr/>
-          <a:lstStyle/>
-          <a:p>
-            <a:pPr marL="0" indent="0">
-              <a:buNone/>
-            </a:pPr>
-            <a:r>
-              <a:rPr lang="ru-RU" dirty="0"/>
-              <a:t>Аргументы в конструктор передаются в бин через &lt;</a:t>
-            </a:r>
+              <a:t>автосвязывания</a:t>
+            </a:r>
+            <a:r>
+              <a:rPr lang="ru-RU" dirty="0"/>
+              <a:t>:</a:t>
+            </a:r>
+          </a:p>
+          <a:p>
             <a:r>
               <a:rPr lang="ru-RU" dirty="0" err="1"/>
-              <a:t>constructor-arg</a:t>
-            </a:r>
-            <a:r>
-              <a:rPr lang="ru-RU" dirty="0"/>
-              <a:t> </a:t>
-            </a:r>
+              <a:t>byName</a:t>
+            </a:r>
+            <a:r>
+              <a:rPr lang="ru-RU" dirty="0"/>
+              <a:t>: контейнер ищет бин с  </a:t>
+            </a:r>
+            <a:r>
+              <a:rPr lang="en-US" dirty="0"/>
+              <a:t>ID </a:t>
+            </a:r>
+            <a:r>
+              <a:rPr lang="ru-RU" dirty="0"/>
+              <a:t>идентичным указанному. Если такой бин не находится, то связывания не происходит.</a:t>
+            </a:r>
+          </a:p>
+          <a:p>
             <a:r>
               <a:rPr lang="ru-RU" dirty="0" err="1"/>
-              <a:t>value</a:t>
-            </a:r>
-            <a:r>
-              <a:rPr lang="ru-RU" dirty="0"/>
-              <a:t>="" или </a:t>
+              <a:t>byType</a:t>
+            </a:r>
+            <a:r>
+              <a:rPr lang="ru-RU" dirty="0"/>
+              <a:t>:  контейнер ищет бин определённого класса , работает если существует только 1 бин типа, указанного в </a:t>
             </a:r>
             <a:r>
               <a:rPr lang="ru-RU" dirty="0" err="1"/>
-              <a:t>ref</a:t>
-            </a:r>
-            <a:r>
-              <a:rPr lang="ru-RU" dirty="0"/>
-              <a:t>=""/&gt; для передачи значения или ссылки на другой бин соответственно.</a:t>
+              <a:t>property</a:t>
+            </a:r>
+            <a:r>
+              <a:rPr lang="ru-RU" dirty="0"/>
+              <a:t>, иначе выбрасывается </a:t>
+            </a:r>
+            <a:r>
+              <a:rPr lang="ru-RU" dirty="0" err="1"/>
+              <a:t>UnsatisfiedDependencyException</a:t>
+            </a:r>
+            <a:r>
+              <a:rPr lang="ru-RU" dirty="0"/>
+              <a:t>.</a:t>
             </a:r>
           </a:p>
           <a:p>
@@ -3047,7 +3097,7 @@
     </p:spTree>
     <p:extLst>
       <p:ext uri="{BB962C8B-B14F-4D97-AF65-F5344CB8AC3E}">
-        <p14:creationId xmlns:p14="http://schemas.microsoft.com/office/powerpoint/2010/main" val="3493002907"/>
+        <p14:creationId xmlns:p14="http://schemas.microsoft.com/office/powerpoint/2010/main" val="1454837224"/>
       </p:ext>
     </p:extLst>
   </p:cSld>
@@ -3084,96 +3134,237 @@
             <p:ph idx="1"/>
           </p:nvPr>
         </p:nvSpPr>
-        <p:spPr/>
-        <p:txBody>
-          <a:bodyPr/>
-          <a:lstStyle/>
+        <p:spPr>
+          <a:xfrm>
+            <a:off x="838200" y="449179"/>
+            <a:ext cx="10515600" cy="5727784"/>
+          </a:xfrm>
+        </p:spPr>
+        <p:txBody>
+          <a:bodyPr>
+            <a:normAutofit fontScale="92500" lnSpcReduction="10000"/>
+          </a:bodyPr>
+          <a:lstStyle/>
+          <a:p>
+            <a:r>
+              <a:rPr lang="ru-RU" dirty="0" err="1"/>
+              <a:t>constructor</a:t>
+            </a:r>
+            <a:r>
+              <a:rPr lang="ru-RU" dirty="0"/>
+              <a:t>: создаёт объект, используя конструктор, использует </a:t>
+            </a:r>
+            <a:r>
+              <a:rPr lang="ru-RU" dirty="0" err="1"/>
+              <a:t>byType</a:t>
+            </a:r>
+            <a:r>
+              <a:rPr lang="ru-RU" dirty="0"/>
+              <a:t> режим.</a:t>
+            </a:r>
+          </a:p>
+          <a:p>
+            <a:r>
+              <a:rPr lang="ru-RU" dirty="0"/>
+              <a:t>Для использования </a:t>
+            </a:r>
+            <a:r>
+              <a:rPr lang="ru-RU" dirty="0" err="1"/>
+              <a:t>автосвязывания</a:t>
+            </a:r>
+            <a:r>
+              <a:rPr lang="ru-RU" dirty="0"/>
+              <a:t> надо указать в </a:t>
+            </a:r>
+            <a:r>
+              <a:rPr lang="ru-RU" dirty="0" err="1"/>
+              <a:t>бине</a:t>
+            </a:r>
+            <a:endParaRPr lang="en-US" dirty="0"/>
+          </a:p>
           <a:p>
             <a:pPr marL="0" indent="0">
               <a:buNone/>
             </a:pPr>
             <a:r>
               <a:rPr lang="ru-RU" dirty="0"/>
-              <a:t>В данном примере класс </a:t>
+              <a:t>И указать тип связывания.</a:t>
+            </a:r>
+          </a:p>
+          <a:p>
+            <a:pPr marL="0" indent="0">
+              <a:buNone/>
+            </a:pPr>
+            <a:r>
+              <a:rPr lang="ru-RU" dirty="0"/>
+              <a:t> </a:t>
+            </a:r>
+          </a:p>
+          <a:p>
+            <a:pPr marL="0" indent="0">
+              <a:buNone/>
+            </a:pPr>
+            <a:r>
+              <a:rPr lang="ru-RU" dirty="0"/>
+              <a:t>В нашем примере имеем </a:t>
+            </a:r>
+          </a:p>
+          <a:p>
+            <a:r>
+              <a:rPr lang="ru-RU" dirty="0"/>
+              <a:t>интерфейс </a:t>
             </a:r>
             <a:r>
               <a:rPr lang="en-US" dirty="0"/>
-              <a:t>Cat </a:t>
-            </a:r>
-            <a:r>
-              <a:rPr lang="ru-RU" dirty="0"/>
-              <a:t>зависит от </a:t>
+              <a:t>Animal (</a:t>
+            </a:r>
+            <a:r>
+              <a:rPr lang="ru-RU" dirty="0"/>
+              <a:t>животное</a:t>
             </a:r>
             <a:r>
               <a:rPr lang="en-US" dirty="0"/>
-              <a:t>Person</a:t>
-            </a:r>
+              <a:t>)</a:t>
+            </a:r>
+            <a:r>
+              <a:rPr lang="ru-RU" dirty="0"/>
+              <a:t>, три класса его реализующие: </a:t>
+            </a:r>
+            <a:r>
+              <a:rPr lang="en-US" dirty="0"/>
+              <a:t>Cat, Dog </a:t>
+            </a:r>
+            <a:r>
+              <a:rPr lang="ru-RU" dirty="0"/>
+              <a:t>и </a:t>
+            </a:r>
+            <a:r>
+              <a:rPr lang="en-US" dirty="0"/>
+              <a:t>Parrot(</a:t>
+            </a:r>
+            <a:r>
+              <a:rPr lang="ru-RU" dirty="0"/>
+              <a:t>кот, собака, попугай</a:t>
+            </a:r>
+            <a:r>
+              <a:rPr lang="en-US" dirty="0"/>
+              <a:t>)</a:t>
+            </a:r>
+          </a:p>
+          <a:p>
+            <a:r>
+              <a:rPr lang="ru-RU" dirty="0"/>
+              <a:t>Три класса – содержащих в себе эти </a:t>
+            </a:r>
+            <a:r>
+              <a:rPr lang="ru-RU" dirty="0" err="1"/>
+              <a:t>бины</a:t>
+            </a:r>
+            <a:r>
+              <a:rPr lang="ru-RU" dirty="0"/>
+              <a:t> (</a:t>
+            </a:r>
+            <a:r>
+              <a:rPr lang="en-CA" dirty="0" err="1"/>
+              <a:t>AnimalShelter</a:t>
+            </a:r>
+            <a:r>
+              <a:rPr lang="en-CA" dirty="0"/>
+              <a:t>, </a:t>
+            </a:r>
+            <a:r>
+              <a:rPr lang="en-CA" dirty="0" err="1"/>
+              <a:t>CatPerson</a:t>
+            </a:r>
+            <a:r>
+              <a:rPr lang="en-CA" dirty="0"/>
+              <a:t>, </a:t>
+            </a:r>
+            <a:r>
+              <a:rPr lang="en-CA" dirty="0" err="1"/>
+              <a:t>PetPerson</a:t>
+            </a:r>
+            <a:r>
+              <a:rPr lang="ru-RU" dirty="0"/>
+              <a:t>).</a:t>
+            </a:r>
+          </a:p>
+          <a:p>
+            <a:r>
+              <a:rPr lang="en-US" dirty="0"/>
+              <a:t> </a:t>
+            </a:r>
+            <a:r>
+              <a:rPr lang="ru-RU" dirty="0"/>
+              <a:t>Два файла с контекстами – с </a:t>
+            </a:r>
+            <a:r>
+              <a:rPr lang="ru-RU" dirty="0" err="1"/>
+              <a:t>автосвязыванием</a:t>
+            </a:r>
+            <a:r>
+              <a:rPr lang="ru-RU" dirty="0"/>
+              <a:t> и без него</a:t>
+            </a:r>
+            <a:r>
+              <a:rPr lang="en-CA" dirty="0"/>
+              <a:t> </a:t>
+            </a:r>
+            <a:r>
+              <a:rPr lang="ru-RU" dirty="0"/>
+              <a:t>(задаём зависимости старым добрым </a:t>
+            </a:r>
+            <a:r>
+              <a:rPr lang="en-CA" dirty="0"/>
+              <a:t>ref</a:t>
+            </a:r>
+            <a:r>
+              <a:rPr lang="ru-RU" dirty="0"/>
+              <a:t>).</a:t>
+            </a:r>
+          </a:p>
+          <a:p>
+            <a:endParaRPr lang="en-US" dirty="0"/>
           </a:p>
           <a:p>
             <a:pPr marL="0" indent="0">
               <a:buNone/>
             </a:pPr>
-            <a:endParaRPr lang="en-US" dirty="0"/>
-          </a:p>
-          <a:p>
-            <a:pPr marL="0" indent="0">
-              <a:buNone/>
-            </a:pPr>
-            <a:endParaRPr lang="en-US" dirty="0"/>
-          </a:p>
-          <a:p>
-            <a:pPr marL="0" indent="0">
-              <a:buNone/>
-            </a:pPr>
-            <a:endParaRPr lang="en-US" dirty="0"/>
-          </a:p>
-          <a:p>
-            <a:pPr marL="0" indent="0">
-              <a:buNone/>
-            </a:pPr>
-            <a:r>
-              <a:rPr lang="ru-RU" dirty="0"/>
-              <a:t>Внедрение зависимости в </a:t>
-            </a:r>
             <a:r>
               <a:rPr lang="en-US" dirty="0"/>
-              <a:t>XML </a:t>
-            </a:r>
-            <a:r>
-              <a:rPr lang="ru-RU" dirty="0"/>
-              <a:t>осуществляется посредством </a:t>
+              <a:t>(</a:t>
+            </a:r>
+            <a:r>
+              <a:rPr lang="ru-RU" dirty="0"/>
+              <a:t>зачем </a:t>
+            </a:r>
+            <a:r>
+              <a:rPr lang="en-CA" dirty="0" err="1"/>
+              <a:t>hashCode</a:t>
+            </a:r>
+            <a:r>
+              <a:rPr lang="en-CA" dirty="0"/>
+              <a:t>() </a:t>
+            </a:r>
+            <a:r>
+              <a:rPr lang="ru-RU" dirty="0"/>
+              <a:t>в </a:t>
+            </a:r>
+            <a:r>
+              <a:rPr lang="en-CA" dirty="0"/>
+              <a:t>main?</a:t>
+            </a:r>
+            <a:r>
+              <a:rPr lang="ru-RU" dirty="0"/>
+              <a:t> И зачем попугай, если его нигде не </a:t>
             </a:r>
             <a:r>
               <a:rPr lang="ru-RU" dirty="0" err="1"/>
-              <a:t>референса</a:t>
-            </a:r>
-            <a:r>
-              <a:rPr lang="ru-RU" dirty="0"/>
-              <a:t> из </a:t>
-            </a:r>
-            <a:r>
-              <a:rPr lang="ru-RU" dirty="0" err="1"/>
-              <a:t>бина</a:t>
-            </a:r>
-            <a:r>
-              <a:rPr lang="ru-RU" dirty="0"/>
-              <a:t> </a:t>
+              <a:t>юзаем</a:t>
             </a:r>
             <a:r>
               <a:rPr lang="en-US" dirty="0"/>
-              <a:t>cat</a:t>
-            </a:r>
-            <a:r>
-              <a:rPr lang="ru-RU" dirty="0"/>
-              <a:t> к </a:t>
-            </a:r>
-            <a:r>
-              <a:rPr lang="ru-RU" dirty="0" err="1"/>
-              <a:t>бину</a:t>
-            </a:r>
-            <a:r>
-              <a:rPr lang="en-US" dirty="0"/>
-              <a:t> person</a:t>
+              <a:t>)</a:t>
             </a:r>
           </a:p>
         </p:txBody>
@@ -3188,8 +3379,8 @@
         </p:nvSpPr>
         <p:spPr bwMode="auto">
           <a:xfrm>
-            <a:off x="838200" y="2463969"/>
-            <a:ext cx="10515600" cy="1015663"/>
+            <a:off x="9817769" y="1376082"/>
+            <a:ext cx="1303562" cy="400110"/>
           </a:xfrm>
           <a:prstGeom prst="rect">
             <a:avLst/>
@@ -3224,7 +3415,7 @@
           </a:extLst>
         </p:spPr>
         <p:txBody>
-          <a:bodyPr vert="horz" wrap="square" lIns="91440" tIns="45720" rIns="91440" bIns="45720" numCol="1" anchor="ctr" anchorCtr="0" compatLnSpc="1">
+          <a:bodyPr vert="horz" wrap="none" lIns="91440" tIns="45720" rIns="91440" bIns="45720" numCol="1" anchor="ctr" anchorCtr="0" compatLnSpc="1">
             <a:prstTxWarp prst="textNoShape">
               <a:avLst/>
             </a:prstTxWarp>
@@ -3249,171 +3440,30 @@
               <a:tabLst/>
             </a:pPr>
             <a:r>
+              <a:rPr kumimoji="0" lang="en-US" altLang="en-US" sz="2000" b="0" i="0" u="none" strike="noStrike" cap="none" normalizeH="0" baseline="0" dirty="0" err="1">
+                <a:ln>
+                  <a:noFill/>
+                </a:ln>
+                <a:solidFill>
+                  <a:srgbClr val="BABABA"/>
+                </a:solidFill>
+                <a:effectLst/>
+                <a:latin typeface="JetBrains Mono"/>
+              </a:rPr>
+              <a:t>autowire</a:t>
+            </a:r>
+            <a:r>
               <a:rPr kumimoji="0" lang="en-US" altLang="en-US" sz="2000" b="0" i="0" u="none" strike="noStrike" cap="none" normalizeH="0" baseline="0" dirty="0">
                 <a:ln>
                   <a:noFill/>
                 </a:ln>
                 <a:solidFill>
-                  <a:srgbClr val="CC7832"/>
+                  <a:srgbClr val="6A8759"/>
                 </a:solidFill>
                 <a:effectLst/>
                 <a:latin typeface="JetBrains Mono"/>
               </a:rPr>
-              <a:t>public class </a:t>
-            </a:r>
-            <a:r>
-              <a:rPr kumimoji="0" lang="en-US" altLang="en-US" sz="2000" b="0" i="0" u="none" strike="noStrike" cap="none" normalizeH="0" baseline="0" dirty="0">
-                <a:ln>
-                  <a:noFill/>
-                </a:ln>
-                <a:solidFill>
-                  <a:srgbClr val="A9B7C6"/>
-                </a:solidFill>
-                <a:effectLst/>
-                <a:latin typeface="JetBrains Mono"/>
-              </a:rPr>
-              <a:t>Cat {</a:t>
-            </a:r>
-            <a:br>
-              <a:rPr kumimoji="0" lang="en-US" altLang="en-US" sz="2000" b="0" i="0" u="none" strike="noStrike" cap="none" normalizeH="0" baseline="0" dirty="0">
-                <a:ln>
-                  <a:noFill/>
-                </a:ln>
-                <a:solidFill>
-                  <a:srgbClr val="A9B7C6"/>
-                </a:solidFill>
-                <a:effectLst/>
-                <a:latin typeface="JetBrains Mono"/>
-              </a:rPr>
-            </a:br>
-            <a:r>
-              <a:rPr kumimoji="0" lang="en-US" altLang="en-US" sz="2000" b="0" i="0" u="none" strike="noStrike" cap="none" normalizeH="0" baseline="0" dirty="0">
-                <a:ln>
-                  <a:noFill/>
-                </a:ln>
-                <a:solidFill>
-                  <a:srgbClr val="A9B7C6"/>
-                </a:solidFill>
-                <a:effectLst/>
-                <a:latin typeface="JetBrains Mono"/>
-              </a:rPr>
-              <a:t>    </a:t>
-            </a:r>
-            <a:r>
-              <a:rPr kumimoji="0" lang="en-US" altLang="en-US" sz="2000" b="0" i="0" u="none" strike="noStrike" cap="none" normalizeH="0" baseline="0" dirty="0">
-                <a:ln>
-                  <a:noFill/>
-                </a:ln>
-                <a:solidFill>
-                  <a:srgbClr val="CC7832"/>
-                </a:solidFill>
-                <a:effectLst/>
-                <a:latin typeface="JetBrains Mono"/>
-              </a:rPr>
-              <a:t>private </a:t>
-            </a:r>
-            <a:r>
-              <a:rPr kumimoji="0" lang="en-US" altLang="en-US" sz="2000" b="0" i="0" u="none" strike="noStrike" cap="none" normalizeH="0" baseline="0" dirty="0">
-                <a:ln>
-                  <a:noFill/>
-                </a:ln>
-                <a:solidFill>
-                  <a:srgbClr val="A9B7C6"/>
-                </a:solidFill>
-                <a:effectLst/>
-                <a:latin typeface="JetBrains Mono"/>
-              </a:rPr>
-              <a:t>String </a:t>
-            </a:r>
-            <a:r>
-              <a:rPr kumimoji="0" lang="en-US" altLang="en-US" sz="2000" b="0" i="0" u="none" strike="noStrike" cap="none" normalizeH="0" baseline="0" dirty="0">
-                <a:ln>
-                  <a:noFill/>
-                </a:ln>
-                <a:solidFill>
-                  <a:srgbClr val="9876AA"/>
-                </a:solidFill>
-                <a:effectLst/>
-                <a:latin typeface="JetBrains Mono"/>
-              </a:rPr>
-              <a:t>name</a:t>
-            </a:r>
-            <a:r>
-              <a:rPr kumimoji="0" lang="en-US" altLang="en-US" sz="2000" b="0" i="0" u="none" strike="noStrike" cap="none" normalizeH="0" baseline="0" dirty="0">
-                <a:ln>
-                  <a:noFill/>
-                </a:ln>
-                <a:solidFill>
-                  <a:srgbClr val="CC7832"/>
-                </a:solidFill>
-                <a:effectLst/>
-                <a:latin typeface="JetBrains Mono"/>
-              </a:rPr>
-              <a:t>;</a:t>
-            </a:r>
-            <a:br>
-              <a:rPr kumimoji="0" lang="en-US" altLang="en-US" sz="2000" b="0" i="0" u="none" strike="noStrike" cap="none" normalizeH="0" baseline="0" dirty="0">
-                <a:ln>
-                  <a:noFill/>
-                </a:ln>
-                <a:solidFill>
-                  <a:srgbClr val="CC7832"/>
-                </a:solidFill>
-                <a:effectLst/>
-                <a:latin typeface="JetBrains Mono"/>
-              </a:rPr>
-            </a:br>
-            <a:r>
-              <a:rPr kumimoji="0" lang="en-US" altLang="en-US" sz="2000" b="0" i="0" u="none" strike="noStrike" cap="none" normalizeH="0" baseline="0" dirty="0">
-                <a:ln>
-                  <a:noFill/>
-                </a:ln>
-                <a:solidFill>
-                  <a:srgbClr val="CC7832"/>
-                </a:solidFill>
-                <a:effectLst/>
-                <a:latin typeface="JetBrains Mono"/>
-              </a:rPr>
-              <a:t>    private </a:t>
-            </a:r>
-            <a:r>
-              <a:rPr kumimoji="0" lang="en-US" altLang="en-US" sz="2000" b="0" i="0" u="none" strike="noStrike" cap="none" normalizeH="0" baseline="0" dirty="0">
-                <a:ln>
-                  <a:noFill/>
-                </a:ln>
-                <a:solidFill>
-                  <a:srgbClr val="A9B7C6"/>
-                </a:solidFill>
-                <a:effectLst/>
-                <a:latin typeface="JetBrains Mono"/>
-              </a:rPr>
-              <a:t>Person </a:t>
-            </a:r>
-            <a:r>
-              <a:rPr kumimoji="0" lang="en-US" altLang="en-US" sz="2000" b="0" i="0" u="none" strike="noStrike" cap="none" normalizeH="0" baseline="0" dirty="0">
-                <a:ln>
-                  <a:noFill/>
-                </a:ln>
-                <a:solidFill>
-                  <a:srgbClr val="9876AA"/>
-                </a:solidFill>
-                <a:effectLst/>
-                <a:latin typeface="JetBrains Mono"/>
-              </a:rPr>
-              <a:t>owner</a:t>
-            </a:r>
-            <a:r>
-              <a:rPr kumimoji="0" lang="en-US" altLang="en-US" sz="2000" b="0" i="0" u="none" strike="noStrike" cap="none" normalizeH="0" baseline="0" dirty="0">
-                <a:ln>
-                  <a:noFill/>
-                </a:ln>
-                <a:solidFill>
-                  <a:srgbClr val="CC7832"/>
-                </a:solidFill>
-                <a:effectLst/>
-                <a:latin typeface="JetBrains Mono"/>
-              </a:rPr>
-              <a:t>;</a:t>
+              <a:t>=</a:t>
             </a:r>
             <a:endParaRPr kumimoji="0" lang="en-US" altLang="en-US" sz="2000" b="0" i="0" u="none" strike="noStrike" cap="none" normalizeH="0" baseline="0" dirty="0">
               <a:ln>
@@ -3431,7 +3481,7 @@
     </p:spTree>
     <p:extLst>
       <p:ext uri="{BB962C8B-B14F-4D97-AF65-F5344CB8AC3E}">
-        <p14:creationId xmlns:p14="http://schemas.microsoft.com/office/powerpoint/2010/main" val="1687046197"/>
+        <p14:creationId xmlns:p14="http://schemas.microsoft.com/office/powerpoint/2010/main" val="4078799245"/>
       </p:ext>
     </p:extLst>
   </p:cSld>
@@ -3460,7 +3510,430 @@
       </p:grpSpPr>
       <p:sp>
         <p:nvSpPr>
-          <p:cNvPr id="4" name="Rectangle 1"/>
+          <p:cNvPr id="3" name="Content Placeholder 2"/>
+          <p:cNvSpPr>
+            <a:spLocks noGrp="1"/>
+          </p:cNvSpPr>
+          <p:nvPr>
+            <p:ph idx="1"/>
+          </p:nvPr>
+        </p:nvSpPr>
+        <p:spPr>
+          <a:xfrm>
+            <a:off x="838200" y="497305"/>
+            <a:ext cx="10515600" cy="5679658"/>
+          </a:xfrm>
+        </p:spPr>
+        <p:txBody>
+          <a:bodyPr/>
+          <a:lstStyle/>
+          <a:p>
+            <a:r>
+              <a:rPr lang="ru-RU" dirty="0" err="1"/>
+              <a:t>Сравнивните</a:t>
+            </a:r>
+            <a:r>
+              <a:rPr lang="ru-RU" dirty="0"/>
+              <a:t> </a:t>
+            </a:r>
+            <a:r>
+              <a:rPr lang="en-US" dirty="0"/>
+              <a:t>XML </a:t>
+            </a:r>
+            <a:r>
+              <a:rPr lang="ru-RU" dirty="0"/>
+              <a:t>файлы с использованием </a:t>
+            </a:r>
+            <a:r>
+              <a:rPr lang="ru-RU" dirty="0" err="1"/>
+              <a:t>автосвязывания</a:t>
+            </a:r>
+            <a:r>
+              <a:rPr lang="ru-RU" dirty="0"/>
+              <a:t> и без.</a:t>
+            </a:r>
+          </a:p>
+          <a:p>
+            <a:r>
+              <a:rPr lang="ru-RU" dirty="0"/>
+              <a:t>Запустите программу с обоими вариантами.</a:t>
+            </a:r>
+          </a:p>
+          <a:p>
+            <a:pPr marL="514350" indent="-514350">
+              <a:buAutoNum type="arabicPeriod"/>
+            </a:pPr>
+            <a:r>
+              <a:rPr lang="ru-RU" dirty="0"/>
+              <a:t>В </a:t>
+            </a:r>
+            <a:r>
+              <a:rPr lang="en-US" dirty="0"/>
+              <a:t>XML </a:t>
+            </a:r>
+            <a:r>
+              <a:rPr lang="ru-RU" dirty="0"/>
+              <a:t>файле с использованием </a:t>
+            </a:r>
+            <a:r>
+              <a:rPr lang="ru-RU" dirty="0" err="1"/>
+              <a:t>автосвязывания</a:t>
+            </a:r>
+            <a:r>
+              <a:rPr lang="ru-RU" dirty="0"/>
+              <a:t> </a:t>
+            </a:r>
+            <a:r>
+              <a:rPr lang="ru-RU" dirty="0" err="1"/>
+              <a:t>расскоментируйте</a:t>
+            </a:r>
+            <a:r>
+              <a:rPr lang="ru-RU" dirty="0"/>
+              <a:t> бин </a:t>
+            </a:r>
+            <a:r>
+              <a:rPr lang="en-US" dirty="0"/>
+              <a:t>animal1 </a:t>
+            </a:r>
+            <a:r>
+              <a:rPr lang="ru-RU" dirty="0"/>
+              <a:t>и оставьте бин </a:t>
+            </a:r>
+            <a:r>
+              <a:rPr lang="en-US" dirty="0"/>
+              <a:t>animal</a:t>
+            </a:r>
+            <a:r>
+              <a:rPr lang="ru-RU" dirty="0"/>
+              <a:t>. Выброситься ошибка. Почему?</a:t>
+            </a:r>
+            <a:endParaRPr lang="en-US" dirty="0"/>
+          </a:p>
+          <a:p>
+            <a:pPr marL="514350" indent="-514350">
+              <a:buAutoNum type="arabicPeriod"/>
+            </a:pPr>
+            <a:r>
+              <a:rPr lang="ru-RU" dirty="0"/>
+              <a:t>Если </a:t>
+            </a:r>
+            <a:r>
+              <a:rPr lang="ru-RU" dirty="0" err="1"/>
+              <a:t>раскомментить</a:t>
+            </a:r>
+            <a:r>
+              <a:rPr lang="ru-RU" dirty="0"/>
+              <a:t> этот бин </a:t>
+            </a:r>
+            <a:r>
+              <a:rPr lang="en-US" dirty="0"/>
+              <a:t>aminal1</a:t>
+            </a:r>
+            <a:r>
+              <a:rPr lang="ru-RU" dirty="0"/>
+              <a:t> и </a:t>
+            </a:r>
+            <a:r>
+              <a:rPr lang="ru-RU" dirty="0" err="1"/>
+              <a:t>закомментить</a:t>
+            </a:r>
+            <a:r>
+              <a:rPr lang="ru-RU" dirty="0"/>
+              <a:t> </a:t>
+            </a:r>
+            <a:r>
+              <a:rPr lang="ru-RU" dirty="0" err="1"/>
+              <a:t>animal</a:t>
+            </a:r>
+            <a:r>
+              <a:rPr lang="ru-RU" dirty="0"/>
+              <a:t> бин, то </a:t>
+            </a:r>
+            <a:r>
+              <a:rPr lang="ru-RU" dirty="0" err="1"/>
+              <a:t>автосвязывания</a:t>
+            </a:r>
+            <a:r>
+              <a:rPr lang="ru-RU" dirty="0"/>
+              <a:t> </a:t>
+            </a:r>
+            <a:r>
+              <a:rPr lang="ru-RU" dirty="0" err="1"/>
+              <a:t>byName</a:t>
+            </a:r>
+            <a:r>
+              <a:rPr lang="ru-RU" dirty="0"/>
+              <a:t> не произойдёт. Почему?</a:t>
+            </a:r>
+            <a:endParaRPr lang="en-US" dirty="0"/>
+          </a:p>
+          <a:p>
+            <a:pPr marL="0" indent="0">
+              <a:buNone/>
+            </a:pPr>
+            <a:endParaRPr lang="en-US" dirty="0"/>
+          </a:p>
+        </p:txBody>
+      </p:sp>
+    </p:spTree>
+    <p:extLst>
+      <p:ext uri="{BB962C8B-B14F-4D97-AF65-F5344CB8AC3E}">
+        <p14:creationId xmlns:p14="http://schemas.microsoft.com/office/powerpoint/2010/main" val="2043830166"/>
+      </p:ext>
+    </p:extLst>
+  </p:cSld>
+  <p:clrMapOvr>
+    <a:masterClrMapping/>
+  </p:clrMapOvr>
+</p:sld>
+</file>
+
+<file path=ppt/slides/slide4.xml><?xml version="1.0" encoding="utf-8"?>
+<p:sld xmlns:a="http://schemas.openxmlformats.org/drawingml/2006/main" xmlns:r="http://schemas.openxmlformats.org/officeDocument/2006/relationships" xmlns:p="http://schemas.openxmlformats.org/presentationml/2006/main">
+  <p:cSld>
+    <p:spTree>
+      <p:nvGrpSpPr>
+        <p:cNvPr id="1" name=""/>
+        <p:cNvGrpSpPr/>
+        <p:nvPr/>
+      </p:nvGrpSpPr>
+      <p:grpSpPr>
+        <a:xfrm>
+          <a:off x="0" y="0"/>
+          <a:ext cx="0" cy="0"/>
+          <a:chOff x="0" y="0"/>
+          <a:chExt cx="0" cy="0"/>
+        </a:xfrm>
+      </p:grpSpPr>
+      <p:sp>
+        <p:nvSpPr>
+          <p:cNvPr id="3" name="Content Placeholder 2"/>
+          <p:cNvSpPr>
+            <a:spLocks noGrp="1"/>
+          </p:cNvSpPr>
+          <p:nvPr>
+            <p:ph idx="1"/>
+          </p:nvPr>
+        </p:nvSpPr>
+        <p:spPr>
+          <a:xfrm>
+            <a:off x="838200" y="513347"/>
+            <a:ext cx="10515600" cy="5663616"/>
+          </a:xfrm>
+        </p:spPr>
+        <p:txBody>
+          <a:bodyPr/>
+          <a:lstStyle/>
+          <a:p>
+            <a:pPr marL="514350" indent="-514350">
+              <a:buAutoNum type="arabicPeriod"/>
+            </a:pPr>
+            <a:r>
+              <a:rPr lang="ru-RU" dirty="0"/>
+              <a:t>Оба </a:t>
+            </a:r>
+            <a:r>
+              <a:rPr lang="ru-RU" dirty="0" err="1"/>
+              <a:t>бина</a:t>
+            </a:r>
+            <a:r>
+              <a:rPr lang="ru-RU" dirty="0"/>
+              <a:t> одного типа С</a:t>
+            </a:r>
+            <a:r>
+              <a:rPr lang="en-US" dirty="0"/>
+              <a:t>at, </a:t>
+            </a:r>
+            <a:r>
+              <a:rPr lang="ru-RU" dirty="0"/>
+              <a:t>поэтому </a:t>
+            </a:r>
+            <a:r>
+              <a:rPr lang="ru-RU" dirty="0" err="1"/>
+              <a:t>автосвязывание</a:t>
+            </a:r>
+            <a:r>
+              <a:rPr lang="ru-RU" dirty="0"/>
+              <a:t> по типу невозможно.</a:t>
+            </a:r>
+            <a:endParaRPr lang="en-US" dirty="0"/>
+          </a:p>
+          <a:p>
+            <a:pPr marL="514350" indent="-514350">
+              <a:buAutoNum type="arabicPeriod"/>
+            </a:pPr>
+            <a:r>
+              <a:rPr lang="ru-RU" dirty="0"/>
+              <a:t>Имена «</a:t>
+            </a:r>
+            <a:r>
+              <a:rPr lang="en-US" dirty="0"/>
+              <a:t>animal1</a:t>
+            </a:r>
+            <a:r>
+              <a:rPr lang="ru-RU" dirty="0"/>
+              <a:t>»</a:t>
+            </a:r>
+            <a:r>
+              <a:rPr lang="en-US" dirty="0"/>
+              <a:t> (</a:t>
+            </a:r>
+            <a:r>
+              <a:rPr lang="ru-RU" dirty="0" err="1"/>
+              <a:t>бина</a:t>
+            </a:r>
+            <a:r>
+              <a:rPr lang="ru-RU" dirty="0"/>
+              <a:t> класса </a:t>
+            </a:r>
+            <a:r>
+              <a:rPr lang="en-US" dirty="0"/>
+              <a:t>Cat) </a:t>
+            </a:r>
+            <a:r>
+              <a:rPr lang="ru-RU" dirty="0"/>
+              <a:t>и зависимости </a:t>
+            </a:r>
+            <a:r>
+              <a:rPr lang="ru-RU" dirty="0" err="1"/>
+              <a:t>бина</a:t>
+            </a:r>
+            <a:r>
+              <a:rPr lang="ru-RU" dirty="0"/>
+              <a:t> </a:t>
+            </a:r>
+            <a:r>
+              <a:rPr lang="en-US" dirty="0" err="1"/>
+              <a:t>animalShelter</a:t>
+            </a:r>
+            <a:r>
+              <a:rPr lang="ru-RU" dirty="0"/>
+              <a:t> «</a:t>
+            </a:r>
+            <a:r>
+              <a:rPr lang="en-US" dirty="0"/>
+              <a:t>animal</a:t>
+            </a:r>
+            <a:r>
+              <a:rPr lang="ru-RU" dirty="0"/>
+              <a:t>»</a:t>
+            </a:r>
+            <a:r>
+              <a:rPr lang="en-US" dirty="0"/>
+              <a:t> </a:t>
+            </a:r>
+            <a:r>
+              <a:rPr lang="ru-RU" dirty="0"/>
+              <a:t> - разные, поэтому связывания не произойдёт</a:t>
+            </a:r>
+            <a:r>
+              <a:rPr lang="ru-RU" dirty="0" smtClean="0"/>
+              <a:t>.</a:t>
+            </a:r>
+            <a:r>
+              <a:rPr lang="en-US" dirty="0" smtClean="0"/>
+              <a:t> </a:t>
+            </a:r>
+          </a:p>
+          <a:p>
+            <a:pPr marL="514350" indent="-514350">
+              <a:buAutoNum type="arabicPeriod"/>
+            </a:pPr>
+            <a:endParaRPr lang="en-US" dirty="0"/>
+          </a:p>
+          <a:p>
+            <a:pPr marL="514350" indent="-514350">
+              <a:buAutoNum type="arabicPeriod"/>
+            </a:pPr>
+            <a:endParaRPr lang="en-US" dirty="0" smtClean="0"/>
+          </a:p>
+          <a:p>
+            <a:pPr marL="514350" indent="-514350">
+              <a:buAutoNum type="arabicPeriod"/>
+            </a:pPr>
+            <a:endParaRPr lang="en-US" dirty="0"/>
+          </a:p>
+          <a:p>
+            <a:pPr marL="0" indent="0">
+              <a:buNone/>
+            </a:pPr>
+            <a:r>
+              <a:rPr lang="ru-RU" dirty="0" smtClean="0"/>
+              <a:t>При создании</a:t>
+            </a:r>
+            <a:r>
+              <a:rPr lang="ru-RU" dirty="0"/>
+              <a:t> </a:t>
+            </a:r>
+            <a:r>
+              <a:rPr lang="ru-RU" dirty="0" smtClean="0"/>
+              <a:t>класса</a:t>
+            </a:r>
+            <a:r>
+              <a:rPr lang="en-CA" dirty="0" smtClean="0"/>
+              <a:t> </a:t>
+            </a:r>
+            <a:r>
+              <a:rPr lang="en-CA" dirty="0" err="1"/>
+              <a:t>petPerson</a:t>
+            </a:r>
+            <a:r>
+              <a:rPr lang="ru-RU" dirty="0"/>
+              <a:t>, </a:t>
+            </a:r>
+            <a:r>
+              <a:rPr lang="ru-RU" dirty="0" smtClean="0"/>
+              <a:t>контейнер «смотрит» </a:t>
+            </a:r>
+            <a:r>
+              <a:rPr lang="ru-RU" dirty="0"/>
+              <a:t>на </a:t>
+            </a:r>
+            <a:r>
+              <a:rPr lang="ru-RU" dirty="0" smtClean="0"/>
+              <a:t>класс(тип) поля (в нашем случае </a:t>
+            </a:r>
+            <a:r>
+              <a:rPr lang="en-CA" dirty="0" smtClean="0"/>
+              <a:t>Animal</a:t>
+            </a:r>
+            <a:r>
+              <a:rPr lang="ru-RU" dirty="0"/>
+              <a:t>)</a:t>
+            </a:r>
+            <a:r>
+              <a:rPr lang="ru-RU" dirty="0" smtClean="0"/>
+              <a:t>, </a:t>
+            </a:r>
+            <a:r>
+              <a:rPr lang="ru-RU" dirty="0"/>
+              <a:t>находит </a:t>
+            </a:r>
+            <a:r>
+              <a:rPr lang="en-CA" dirty="0"/>
+              <a:t>animal </a:t>
+            </a:r>
+            <a:r>
+              <a:rPr lang="ru-RU" dirty="0"/>
+              <a:t>бин, и подставляет его по </a:t>
+            </a:r>
+            <a:r>
+              <a:rPr lang="ru-RU" dirty="0" smtClean="0"/>
+              <a:t>имени.</a:t>
+            </a:r>
+            <a:endParaRPr lang="ru-RU" dirty="0"/>
+          </a:p>
+          <a:p>
+            <a:pPr marL="514350" indent="-514350">
+              <a:buAutoNum type="arabicPeriod"/>
+            </a:pPr>
+            <a:endParaRPr lang="en-US" dirty="0"/>
+          </a:p>
+        </p:txBody>
+      </p:sp>
+      <p:sp>
+        <p:nvSpPr>
+          <p:cNvPr id="2" name="Rectangle 1"/>
           <p:cNvSpPr>
             <a:spLocks noChangeArrowheads="1"/>
           </p:cNvSpPr>
@@ -3468,8 +3941,8 @@
         </p:nvSpPr>
         <p:spPr bwMode="auto">
           <a:xfrm>
-            <a:off x="786063" y="600688"/>
-            <a:ext cx="10427369" cy="3170099"/>
+            <a:off x="1247775" y="2991212"/>
+            <a:ext cx="2935419" cy="707886"/>
           </a:xfrm>
           <a:prstGeom prst="rect">
             <a:avLst/>
@@ -3504,7 +3977,7 @@
           </a:extLst>
         </p:spPr>
         <p:txBody>
-          <a:bodyPr vert="horz" wrap="square" lIns="91440" tIns="45720" rIns="91440" bIns="45720" numCol="1" anchor="ctr" anchorCtr="0" compatLnSpc="1">
+          <a:bodyPr vert="horz" wrap="none" lIns="91440" tIns="45720" rIns="91440" bIns="45720" numCol="1" anchor="ctr" anchorCtr="0" compatLnSpc="1">
             <a:prstTxWarp prst="textNoShape">
               <a:avLst/>
             </a:prstTxWarp>
@@ -3529,868 +4002,96 @@
               <a:tabLst/>
             </a:pPr>
             <a:r>
-              <a:rPr kumimoji="0" lang="en-US" altLang="en-US" sz="2000" b="0" i="0" u="none" strike="noStrike" cap="none" normalizeH="0" baseline="0" dirty="0">
+              <a:rPr kumimoji="0" lang="en-US" altLang="en-US" sz="2000" b="0" i="0" u="none" strike="noStrike" cap="none" normalizeH="0" baseline="0" dirty="0" smtClean="0">
                 <a:ln>
                   <a:noFill/>
                 </a:ln>
                 <a:solidFill>
-                  <a:srgbClr val="E8BF6A"/>
+                  <a:srgbClr val="CC7832"/>
                 </a:solidFill>
                 <a:effectLst/>
                 <a:latin typeface="JetBrains Mono"/>
               </a:rPr>
-              <a:t>&lt;bean </a:t>
-            </a:r>
-            <a:r>
-              <a:rPr kumimoji="0" lang="en-US" altLang="en-US" sz="2000" b="0" i="0" u="none" strike="noStrike" cap="none" normalizeH="0" baseline="0" dirty="0">
+              <a:t>public class </a:t>
+            </a:r>
+            <a:r>
+              <a:rPr kumimoji="0" lang="en-US" altLang="en-US" sz="2000" b="0" i="0" u="none" strike="noStrike" cap="none" normalizeH="0" baseline="0" dirty="0" err="1" smtClean="0">
                 <a:ln>
                   <a:noFill/>
                 </a:ln>
                 <a:solidFill>
-                  <a:srgbClr val="BABABA"/>
+                  <a:srgbClr val="A9B7C6"/>
                 </a:solidFill>
                 <a:effectLst/>
                 <a:latin typeface="JetBrains Mono"/>
               </a:rPr>
-              <a:t>name</a:t>
-            </a:r>
-            <a:r>
-              <a:rPr kumimoji="0" lang="en-US" altLang="en-US" sz="2000" b="0" i="0" u="none" strike="noStrike" cap="none" normalizeH="0" baseline="0" dirty="0">
+              <a:t>PetPerson</a:t>
+            </a:r>
+            <a:r>
+              <a:rPr kumimoji="0" lang="en-US" altLang="en-US" sz="2000" b="0" i="0" u="none" strike="noStrike" cap="none" normalizeH="0" baseline="0" dirty="0" smtClean="0">
                 <a:ln>
                   <a:noFill/>
                 </a:ln>
                 <a:solidFill>
-                  <a:srgbClr val="6A8759"/>
+                  <a:srgbClr val="A9B7C6"/>
                 </a:solidFill>
                 <a:effectLst/>
                 <a:latin typeface="JetBrains Mono"/>
               </a:rPr>
-              <a:t>="person" </a:t>
-            </a:r>
-            <a:r>
-              <a:rPr kumimoji="0" lang="en-US" altLang="en-US" sz="2000" b="0" i="0" u="none" strike="noStrike" cap="none" normalizeH="0" baseline="0" dirty="0">
+              <a:t> {</a:t>
+            </a:r>
+            <a:br>
+              <a:rPr kumimoji="0" lang="en-US" altLang="en-US" sz="2000" b="0" i="0" u="none" strike="noStrike" cap="none" normalizeH="0" baseline="0" dirty="0" smtClean="0">
                 <a:ln>
                   <a:noFill/>
                 </a:ln>
                 <a:solidFill>
-                  <a:srgbClr val="BABABA"/>
-                </a:solidFill>
-                <a:effectLst/>
-                <a:latin typeface="JetBrains Mono"/>
-              </a:rPr>
-              <a:t>class</a:t>
-            </a:r>
-            <a:r>
-              <a:rPr kumimoji="0" lang="en-US" altLang="en-US" sz="2000" b="0" i="0" u="none" strike="noStrike" cap="none" normalizeH="0" baseline="0" dirty="0">
-                <a:ln>
-                  <a:noFill/>
-                </a:ln>
-                <a:solidFill>
-                  <a:srgbClr val="6A8759"/>
-                </a:solidFill>
-                <a:effectLst/>
-                <a:latin typeface="JetBrains Mono"/>
-              </a:rPr>
-              <a:t>="com.volkov.IoC.example10.Person"</a:t>
-            </a:r>
-            <a:r>
-              <a:rPr kumimoji="0" lang="en-US" altLang="en-US" sz="2000" b="0" i="0" u="none" strike="noStrike" cap="none" normalizeH="0" baseline="0" dirty="0">
-                <a:ln>
-                  <a:noFill/>
-                </a:ln>
-                <a:solidFill>
-                  <a:srgbClr val="E8BF6A"/>
-                </a:solidFill>
-                <a:effectLst/>
-                <a:latin typeface="JetBrains Mono"/>
-              </a:rPr>
-              <a:t>&gt;</a:t>
-            </a:r>
-            <a:br>
-              <a:rPr kumimoji="0" lang="en-US" altLang="en-US" sz="2000" b="0" i="0" u="none" strike="noStrike" cap="none" normalizeH="0" baseline="0" dirty="0">
-                <a:ln>
-                  <a:noFill/>
-                </a:ln>
-                <a:solidFill>
-                  <a:srgbClr val="E8BF6A"/>
+                  <a:srgbClr val="A9B7C6"/>
                 </a:solidFill>
                 <a:effectLst/>
                 <a:latin typeface="JetBrains Mono"/>
               </a:rPr>
             </a:br>
             <a:r>
-              <a:rPr kumimoji="0" lang="en-US" altLang="en-US" sz="2000" b="0" i="0" u="none" strike="noStrike" cap="none" normalizeH="0" baseline="0" dirty="0">
+              <a:rPr kumimoji="0" lang="en-US" altLang="en-US" sz="2000" b="0" i="0" u="none" strike="noStrike" cap="none" normalizeH="0" baseline="0" dirty="0" smtClean="0">
                 <a:ln>
                   <a:noFill/>
                 </a:ln>
                 <a:solidFill>
-                  <a:srgbClr val="E8BF6A"/>
+                  <a:srgbClr val="A9B7C6"/>
                 </a:solidFill>
                 <a:effectLst/>
                 <a:latin typeface="JetBrains Mono"/>
               </a:rPr>
-              <a:t>    &lt;constructor-</a:t>
-            </a:r>
-            <a:r>
-              <a:rPr kumimoji="0" lang="en-US" altLang="en-US" sz="2000" b="0" i="0" u="none" strike="noStrike" cap="none" normalizeH="0" baseline="0" dirty="0" err="1">
+              <a:t>    Animal </a:t>
+            </a:r>
+            <a:r>
+              <a:rPr kumimoji="0" lang="en-US" altLang="en-US" sz="2000" b="0" i="0" u="none" strike="noStrike" cap="none" normalizeH="0" baseline="0" dirty="0" err="1" smtClean="0">
                 <a:ln>
                   <a:noFill/>
                 </a:ln>
                 <a:solidFill>
-                  <a:srgbClr val="E8BF6A"/>
+                  <a:srgbClr val="9876AA"/>
                 </a:solidFill>
                 <a:effectLst/>
                 <a:latin typeface="JetBrains Mono"/>
               </a:rPr>
-              <a:t>arg</a:t>
-            </a:r>
-            <a:r>
-              <a:rPr kumimoji="0" lang="en-US" altLang="en-US" sz="2000" b="0" i="0" u="none" strike="noStrike" cap="none" normalizeH="0" baseline="0" dirty="0">
+              <a:t>animal</a:t>
+            </a:r>
+            <a:r>
+              <a:rPr kumimoji="0" lang="en-US" altLang="en-US" sz="2000" b="0" i="0" u="none" strike="noStrike" cap="none" normalizeH="0" baseline="0" dirty="0" smtClean="0">
                 <a:ln>
                   <a:noFill/>
                 </a:ln>
                 <a:solidFill>
-                  <a:srgbClr val="E8BF6A"/>
+                  <a:srgbClr val="CC7832"/>
                 </a:solidFill>
                 <a:effectLst/>
                 <a:latin typeface="JetBrains Mono"/>
               </a:rPr>
-              <a:t> </a:t>
-            </a:r>
-            <a:r>
-              <a:rPr kumimoji="0" lang="en-US" altLang="en-US" sz="2000" b="0" i="0" u="none" strike="noStrike" cap="none" normalizeH="0" baseline="0" dirty="0">
-                <a:ln>
-                  <a:noFill/>
-                </a:ln>
-                <a:solidFill>
-                  <a:srgbClr val="BABABA"/>
-                </a:solidFill>
-                <a:effectLst/>
-                <a:latin typeface="JetBrains Mono"/>
-              </a:rPr>
-              <a:t>name</a:t>
-            </a:r>
-            <a:r>
-              <a:rPr kumimoji="0" lang="en-US" altLang="en-US" sz="2000" b="0" i="0" u="none" strike="noStrike" cap="none" normalizeH="0" baseline="0" dirty="0">
-                <a:ln>
-                  <a:noFill/>
-                </a:ln>
-                <a:solidFill>
-                  <a:srgbClr val="6A8759"/>
-                </a:solidFill>
-                <a:effectLst/>
-                <a:latin typeface="JetBrains Mono"/>
-              </a:rPr>
-              <a:t>="</a:t>
-            </a:r>
-            <a:r>
-              <a:rPr kumimoji="0" lang="en-US" altLang="en-US" sz="2000" b="0" i="0" u="none" strike="noStrike" cap="none" normalizeH="0" baseline="0" dirty="0" err="1">
-                <a:ln>
-                  <a:noFill/>
-                </a:ln>
-                <a:solidFill>
-                  <a:srgbClr val="6A8759"/>
-                </a:solidFill>
-                <a:effectLst/>
-                <a:latin typeface="JetBrains Mono"/>
-              </a:rPr>
-              <a:t>firstName</a:t>
-            </a:r>
-            <a:r>
-              <a:rPr kumimoji="0" lang="en-US" altLang="en-US" sz="2000" b="0" i="0" u="none" strike="noStrike" cap="none" normalizeH="0" baseline="0" dirty="0">
-                <a:ln>
-                  <a:noFill/>
-                </a:ln>
-                <a:solidFill>
-                  <a:srgbClr val="6A8759"/>
-                </a:solidFill>
-                <a:effectLst/>
-                <a:latin typeface="JetBrains Mono"/>
-              </a:rPr>
-              <a:t>" </a:t>
-            </a:r>
-            <a:r>
-              <a:rPr kumimoji="0" lang="en-US" altLang="en-US" sz="2000" b="0" i="0" u="none" strike="noStrike" cap="none" normalizeH="0" baseline="0" dirty="0">
-                <a:ln>
-                  <a:noFill/>
-                </a:ln>
-                <a:solidFill>
-                  <a:srgbClr val="BABABA"/>
-                </a:solidFill>
-                <a:effectLst/>
-                <a:latin typeface="JetBrains Mono"/>
-              </a:rPr>
-              <a:t>value</a:t>
-            </a:r>
-            <a:r>
-              <a:rPr kumimoji="0" lang="en-US" altLang="en-US" sz="2000" b="0" i="0" u="none" strike="noStrike" cap="none" normalizeH="0" baseline="0" dirty="0">
-                <a:ln>
-                  <a:noFill/>
-                </a:ln>
-                <a:solidFill>
-                  <a:srgbClr val="6A8759"/>
-                </a:solidFill>
-                <a:effectLst/>
-                <a:latin typeface="JetBrains Mono"/>
-              </a:rPr>
-              <a:t>="Ivan"</a:t>
-            </a:r>
-            <a:r>
-              <a:rPr kumimoji="0" lang="en-US" altLang="en-US" sz="2000" b="0" i="0" u="none" strike="noStrike" cap="none" normalizeH="0" baseline="0" dirty="0">
-                <a:ln>
-                  <a:noFill/>
-                </a:ln>
-                <a:solidFill>
-                  <a:srgbClr val="E8BF6A"/>
-                </a:solidFill>
-                <a:effectLst/>
-                <a:latin typeface="JetBrains Mono"/>
-              </a:rPr>
-              <a:t>/&gt;</a:t>
-            </a:r>
-            <a:br>
-              <a:rPr kumimoji="0" lang="en-US" altLang="en-US" sz="2000" b="0" i="0" u="none" strike="noStrike" cap="none" normalizeH="0" baseline="0" dirty="0">
-                <a:ln>
-                  <a:noFill/>
-                </a:ln>
-                <a:solidFill>
-                  <a:srgbClr val="E8BF6A"/>
-                </a:solidFill>
-                <a:effectLst/>
-                <a:latin typeface="JetBrains Mono"/>
-              </a:rPr>
-            </a:br>
-            <a:r>
-              <a:rPr kumimoji="0" lang="en-US" altLang="en-US" sz="2000" b="0" i="0" u="none" strike="noStrike" cap="none" normalizeH="0" baseline="0" dirty="0">
-                <a:ln>
-                  <a:noFill/>
-                </a:ln>
-                <a:solidFill>
-                  <a:srgbClr val="E8BF6A"/>
-                </a:solidFill>
-                <a:effectLst/>
-                <a:latin typeface="JetBrains Mono"/>
-              </a:rPr>
-              <a:t>    &lt;constructor-</a:t>
-            </a:r>
-            <a:r>
-              <a:rPr kumimoji="0" lang="en-US" altLang="en-US" sz="2000" b="0" i="0" u="none" strike="noStrike" cap="none" normalizeH="0" baseline="0" dirty="0" err="1">
-                <a:ln>
-                  <a:noFill/>
-                </a:ln>
-                <a:solidFill>
-                  <a:srgbClr val="E8BF6A"/>
-                </a:solidFill>
-                <a:effectLst/>
-                <a:latin typeface="JetBrains Mono"/>
-              </a:rPr>
-              <a:t>arg</a:t>
-            </a:r>
-            <a:r>
-              <a:rPr kumimoji="0" lang="en-US" altLang="en-US" sz="2000" b="0" i="0" u="none" strike="noStrike" cap="none" normalizeH="0" baseline="0" dirty="0">
-                <a:ln>
-                  <a:noFill/>
-                </a:ln>
-                <a:solidFill>
-                  <a:srgbClr val="E8BF6A"/>
-                </a:solidFill>
-                <a:effectLst/>
-                <a:latin typeface="JetBrains Mono"/>
-              </a:rPr>
-              <a:t> </a:t>
-            </a:r>
-            <a:r>
-              <a:rPr kumimoji="0" lang="en-US" altLang="en-US" sz="2000" b="0" i="0" u="none" strike="noStrike" cap="none" normalizeH="0" baseline="0" dirty="0">
-                <a:ln>
-                  <a:noFill/>
-                </a:ln>
-                <a:solidFill>
-                  <a:srgbClr val="BABABA"/>
-                </a:solidFill>
-                <a:effectLst/>
-                <a:latin typeface="JetBrains Mono"/>
-              </a:rPr>
-              <a:t>name</a:t>
-            </a:r>
-            <a:r>
-              <a:rPr kumimoji="0" lang="en-US" altLang="en-US" sz="2000" b="0" i="0" u="none" strike="noStrike" cap="none" normalizeH="0" baseline="0" dirty="0">
-                <a:ln>
-                  <a:noFill/>
-                </a:ln>
-                <a:solidFill>
-                  <a:srgbClr val="6A8759"/>
-                </a:solidFill>
-                <a:effectLst/>
-                <a:latin typeface="JetBrains Mono"/>
-              </a:rPr>
-              <a:t>="surname" </a:t>
-            </a:r>
-            <a:r>
-              <a:rPr kumimoji="0" lang="en-US" altLang="en-US" sz="2000" b="0" i="0" u="none" strike="noStrike" cap="none" normalizeH="0" baseline="0" dirty="0">
-                <a:ln>
-                  <a:noFill/>
-                </a:ln>
-                <a:solidFill>
-                  <a:srgbClr val="BABABA"/>
-                </a:solidFill>
-                <a:effectLst/>
-                <a:latin typeface="JetBrains Mono"/>
-              </a:rPr>
-              <a:t>value</a:t>
-            </a:r>
-            <a:r>
-              <a:rPr kumimoji="0" lang="en-US" altLang="en-US" sz="2000" b="0" i="0" u="none" strike="noStrike" cap="none" normalizeH="0" baseline="0" dirty="0">
-                <a:ln>
-                  <a:noFill/>
-                </a:ln>
-                <a:solidFill>
-                  <a:srgbClr val="6A8759"/>
-                </a:solidFill>
-                <a:effectLst/>
-                <a:latin typeface="JetBrains Mono"/>
-              </a:rPr>
-              <a:t>="Ivanov"</a:t>
-            </a:r>
-            <a:r>
-              <a:rPr kumimoji="0" lang="en-US" altLang="en-US" sz="2000" b="0" i="0" u="none" strike="noStrike" cap="none" normalizeH="0" baseline="0" dirty="0">
-                <a:ln>
-                  <a:noFill/>
-                </a:ln>
-                <a:solidFill>
-                  <a:srgbClr val="E8BF6A"/>
-                </a:solidFill>
-                <a:effectLst/>
-                <a:latin typeface="JetBrains Mono"/>
-              </a:rPr>
-              <a:t>/&gt;</a:t>
-            </a:r>
-            <a:br>
-              <a:rPr kumimoji="0" lang="en-US" altLang="en-US" sz="2000" b="0" i="0" u="none" strike="noStrike" cap="none" normalizeH="0" baseline="0" dirty="0">
-                <a:ln>
-                  <a:noFill/>
-                </a:ln>
-                <a:solidFill>
-                  <a:srgbClr val="E8BF6A"/>
-                </a:solidFill>
-                <a:effectLst/>
-                <a:latin typeface="JetBrains Mono"/>
-              </a:rPr>
-            </a:br>
-            <a:r>
-              <a:rPr kumimoji="0" lang="en-US" altLang="en-US" sz="2000" b="0" i="0" u="none" strike="noStrike" cap="none" normalizeH="0" baseline="0" dirty="0">
-                <a:ln>
-                  <a:noFill/>
-                </a:ln>
-                <a:solidFill>
-                  <a:srgbClr val="E8BF6A"/>
-                </a:solidFill>
-                <a:effectLst/>
-                <a:latin typeface="JetBrains Mono"/>
-              </a:rPr>
-              <a:t>    &lt;constructor-</a:t>
-            </a:r>
-            <a:r>
-              <a:rPr kumimoji="0" lang="en-US" altLang="en-US" sz="2000" b="0" i="0" u="none" strike="noStrike" cap="none" normalizeH="0" baseline="0" dirty="0" err="1">
-                <a:ln>
-                  <a:noFill/>
-                </a:ln>
-                <a:solidFill>
-                  <a:srgbClr val="E8BF6A"/>
-                </a:solidFill>
-                <a:effectLst/>
-                <a:latin typeface="JetBrains Mono"/>
-              </a:rPr>
-              <a:t>arg</a:t>
-            </a:r>
-            <a:r>
-              <a:rPr kumimoji="0" lang="en-US" altLang="en-US" sz="2000" b="0" i="0" u="none" strike="noStrike" cap="none" normalizeH="0" baseline="0" dirty="0">
-                <a:ln>
-                  <a:noFill/>
-                </a:ln>
-                <a:solidFill>
-                  <a:srgbClr val="E8BF6A"/>
-                </a:solidFill>
-                <a:effectLst/>
-                <a:latin typeface="JetBrains Mono"/>
-              </a:rPr>
-              <a:t> </a:t>
-            </a:r>
-            <a:r>
-              <a:rPr kumimoji="0" lang="en-US" altLang="en-US" sz="2000" b="0" i="0" u="none" strike="noStrike" cap="none" normalizeH="0" baseline="0" dirty="0">
-                <a:ln>
-                  <a:noFill/>
-                </a:ln>
-                <a:solidFill>
-                  <a:srgbClr val="BABABA"/>
-                </a:solidFill>
-                <a:effectLst/>
-                <a:latin typeface="JetBrains Mono"/>
-              </a:rPr>
-              <a:t>name</a:t>
-            </a:r>
-            <a:r>
-              <a:rPr kumimoji="0" lang="en-US" altLang="en-US" sz="2000" b="0" i="0" u="none" strike="noStrike" cap="none" normalizeH="0" baseline="0" dirty="0">
-                <a:ln>
-                  <a:noFill/>
-                </a:ln>
-                <a:solidFill>
-                  <a:srgbClr val="6A8759"/>
-                </a:solidFill>
-                <a:effectLst/>
-                <a:latin typeface="JetBrains Mono"/>
-              </a:rPr>
-              <a:t>="age" </a:t>
-            </a:r>
-            <a:r>
-              <a:rPr kumimoji="0" lang="en-US" altLang="en-US" sz="2000" b="0" i="0" u="none" strike="noStrike" cap="none" normalizeH="0" baseline="0" dirty="0">
-                <a:ln>
-                  <a:noFill/>
-                </a:ln>
-                <a:solidFill>
-                  <a:srgbClr val="BABABA"/>
-                </a:solidFill>
-                <a:effectLst/>
-                <a:latin typeface="JetBrains Mono"/>
-              </a:rPr>
-              <a:t>value</a:t>
-            </a:r>
-            <a:r>
-              <a:rPr kumimoji="0" lang="en-US" altLang="en-US" sz="2000" b="0" i="0" u="none" strike="noStrike" cap="none" normalizeH="0" baseline="0" dirty="0">
-                <a:ln>
-                  <a:noFill/>
-                </a:ln>
-                <a:solidFill>
-                  <a:srgbClr val="6A8759"/>
-                </a:solidFill>
-                <a:effectLst/>
-                <a:latin typeface="JetBrains Mono"/>
-              </a:rPr>
-              <a:t>="29"</a:t>
-            </a:r>
-            <a:r>
-              <a:rPr kumimoji="0" lang="en-US" altLang="en-US" sz="2000" b="0" i="0" u="none" strike="noStrike" cap="none" normalizeH="0" baseline="0" dirty="0">
-                <a:ln>
-                  <a:noFill/>
-                </a:ln>
-                <a:solidFill>
-                  <a:srgbClr val="E8BF6A"/>
-                </a:solidFill>
-                <a:effectLst/>
-                <a:latin typeface="JetBrains Mono"/>
-              </a:rPr>
-              <a:t>/&gt;</a:t>
-            </a:r>
-            <a:br>
-              <a:rPr kumimoji="0" lang="en-US" altLang="en-US" sz="2000" b="0" i="0" u="none" strike="noStrike" cap="none" normalizeH="0" baseline="0" dirty="0">
-                <a:ln>
-                  <a:noFill/>
-                </a:ln>
-                <a:solidFill>
-                  <a:srgbClr val="E8BF6A"/>
-                </a:solidFill>
-                <a:effectLst/>
-                <a:latin typeface="JetBrains Mono"/>
-              </a:rPr>
-            </a:br>
-            <a:r>
-              <a:rPr kumimoji="0" lang="en-US" altLang="en-US" sz="2000" b="0" i="0" u="none" strike="noStrike" cap="none" normalizeH="0" baseline="0" dirty="0">
-                <a:ln>
-                  <a:noFill/>
-                </a:ln>
-                <a:solidFill>
-                  <a:srgbClr val="E8BF6A"/>
-                </a:solidFill>
-                <a:effectLst/>
-                <a:latin typeface="JetBrains Mono"/>
-              </a:rPr>
-              <a:t>&lt;/bean&gt;</a:t>
-            </a:r>
-            <a:br>
-              <a:rPr kumimoji="0" lang="en-US" altLang="en-US" sz="2000" b="0" i="0" u="none" strike="noStrike" cap="none" normalizeH="0" baseline="0" dirty="0">
-                <a:ln>
-                  <a:noFill/>
-                </a:ln>
-                <a:solidFill>
-                  <a:srgbClr val="E8BF6A"/>
-                </a:solidFill>
-                <a:effectLst/>
-                <a:latin typeface="JetBrains Mono"/>
-              </a:rPr>
-            </a:br>
-            <a:br>
-              <a:rPr kumimoji="0" lang="en-US" altLang="en-US" sz="2000" b="0" i="0" u="none" strike="noStrike" cap="none" normalizeH="0" baseline="0" dirty="0">
-                <a:ln>
-                  <a:noFill/>
-                </a:ln>
-                <a:solidFill>
-                  <a:srgbClr val="E8BF6A"/>
-                </a:solidFill>
-                <a:effectLst/>
-                <a:latin typeface="JetBrains Mono"/>
-              </a:rPr>
-            </a:br>
-            <a:r>
-              <a:rPr kumimoji="0" lang="en-US" altLang="en-US" sz="2000" b="0" i="0" u="none" strike="noStrike" cap="none" normalizeH="0" baseline="0" dirty="0">
-                <a:ln>
-                  <a:noFill/>
-                </a:ln>
-                <a:solidFill>
-                  <a:srgbClr val="E8BF6A"/>
-                </a:solidFill>
-                <a:effectLst/>
-                <a:latin typeface="JetBrains Mono"/>
-              </a:rPr>
-              <a:t>&lt;bean </a:t>
-            </a:r>
-            <a:r>
-              <a:rPr kumimoji="0" lang="en-US" altLang="en-US" sz="2000" b="0" i="0" u="none" strike="noStrike" cap="none" normalizeH="0" baseline="0" dirty="0">
-                <a:ln>
-                  <a:noFill/>
-                </a:ln>
-                <a:solidFill>
-                  <a:srgbClr val="BABABA"/>
-                </a:solidFill>
-                <a:effectLst/>
-                <a:latin typeface="JetBrains Mono"/>
-              </a:rPr>
-              <a:t>name</a:t>
-            </a:r>
-            <a:r>
-              <a:rPr kumimoji="0" lang="en-US" altLang="en-US" sz="2000" b="0" i="0" u="none" strike="noStrike" cap="none" normalizeH="0" baseline="0" dirty="0">
-                <a:ln>
-                  <a:noFill/>
-                </a:ln>
-                <a:solidFill>
-                  <a:srgbClr val="6A8759"/>
-                </a:solidFill>
-                <a:effectLst/>
-                <a:latin typeface="JetBrains Mono"/>
-              </a:rPr>
-              <a:t>="cat" </a:t>
-            </a:r>
-            <a:r>
-              <a:rPr kumimoji="0" lang="en-US" altLang="en-US" sz="2000" b="0" i="0" u="none" strike="noStrike" cap="none" normalizeH="0" baseline="0" dirty="0">
-                <a:ln>
-                  <a:noFill/>
-                </a:ln>
-                <a:solidFill>
-                  <a:srgbClr val="BABABA"/>
-                </a:solidFill>
-                <a:effectLst/>
-                <a:latin typeface="JetBrains Mono"/>
-              </a:rPr>
-              <a:t>class</a:t>
-            </a:r>
-            <a:r>
-              <a:rPr kumimoji="0" lang="en-US" altLang="en-US" sz="2000" b="0" i="0" u="none" strike="noStrike" cap="none" normalizeH="0" baseline="0" dirty="0">
-                <a:ln>
-                  <a:noFill/>
-                </a:ln>
-                <a:solidFill>
-                  <a:srgbClr val="6A8759"/>
-                </a:solidFill>
-                <a:effectLst/>
-                <a:latin typeface="JetBrains Mono"/>
-              </a:rPr>
-              <a:t>="com.volkov.IoC.example10.Cat"</a:t>
-            </a:r>
-            <a:r>
-              <a:rPr kumimoji="0" lang="en-US" altLang="en-US" sz="2000" b="0" i="0" u="none" strike="noStrike" cap="none" normalizeH="0" baseline="0" dirty="0">
-                <a:ln>
-                  <a:noFill/>
-                </a:ln>
-                <a:solidFill>
-                  <a:srgbClr val="E8BF6A"/>
-                </a:solidFill>
-                <a:effectLst/>
-                <a:latin typeface="JetBrains Mono"/>
-              </a:rPr>
-              <a:t>&gt;</a:t>
-            </a:r>
-            <a:br>
-              <a:rPr kumimoji="0" lang="en-US" altLang="en-US" sz="2000" b="0" i="0" u="none" strike="noStrike" cap="none" normalizeH="0" baseline="0" dirty="0">
-                <a:ln>
-                  <a:noFill/>
-                </a:ln>
-                <a:solidFill>
-                  <a:srgbClr val="E8BF6A"/>
-                </a:solidFill>
-                <a:effectLst/>
-                <a:latin typeface="JetBrains Mono"/>
-              </a:rPr>
-            </a:br>
-            <a:r>
-              <a:rPr kumimoji="0" lang="en-US" altLang="en-US" sz="2000" b="0" i="0" u="none" strike="noStrike" cap="none" normalizeH="0" baseline="0" dirty="0">
-                <a:ln>
-                  <a:noFill/>
-                </a:ln>
-                <a:solidFill>
-                  <a:srgbClr val="E8BF6A"/>
-                </a:solidFill>
-                <a:effectLst/>
-                <a:latin typeface="JetBrains Mono"/>
-              </a:rPr>
-              <a:t>    &lt;constructor-</a:t>
-            </a:r>
-            <a:r>
-              <a:rPr kumimoji="0" lang="en-US" altLang="en-US" sz="2000" b="0" i="0" u="none" strike="noStrike" cap="none" normalizeH="0" baseline="0" dirty="0" err="1">
-                <a:ln>
-                  <a:noFill/>
-                </a:ln>
-                <a:solidFill>
-                  <a:srgbClr val="E8BF6A"/>
-                </a:solidFill>
-                <a:effectLst/>
-                <a:latin typeface="JetBrains Mono"/>
-              </a:rPr>
-              <a:t>arg</a:t>
-            </a:r>
-            <a:r>
-              <a:rPr kumimoji="0" lang="en-US" altLang="en-US" sz="2000" b="0" i="0" u="none" strike="noStrike" cap="none" normalizeH="0" baseline="0" dirty="0">
-                <a:ln>
-                  <a:noFill/>
-                </a:ln>
-                <a:solidFill>
-                  <a:srgbClr val="E8BF6A"/>
-                </a:solidFill>
-                <a:effectLst/>
-                <a:latin typeface="JetBrains Mono"/>
-              </a:rPr>
-              <a:t> </a:t>
-            </a:r>
-            <a:r>
-              <a:rPr kumimoji="0" lang="en-US" altLang="en-US" sz="2000" b="0" i="0" u="none" strike="noStrike" cap="none" normalizeH="0" baseline="0" dirty="0">
-                <a:ln>
-                  <a:noFill/>
-                </a:ln>
-                <a:solidFill>
-                  <a:srgbClr val="BABABA"/>
-                </a:solidFill>
-                <a:effectLst/>
-                <a:latin typeface="JetBrains Mono"/>
-              </a:rPr>
-              <a:t>name</a:t>
-            </a:r>
-            <a:r>
-              <a:rPr kumimoji="0" lang="en-US" altLang="en-US" sz="2000" b="0" i="0" u="none" strike="noStrike" cap="none" normalizeH="0" baseline="0" dirty="0">
-                <a:ln>
-                  <a:noFill/>
-                </a:ln>
-                <a:solidFill>
-                  <a:srgbClr val="6A8759"/>
-                </a:solidFill>
-                <a:effectLst/>
-                <a:latin typeface="JetBrains Mono"/>
-              </a:rPr>
-              <a:t>="name" </a:t>
-            </a:r>
-            <a:r>
-              <a:rPr kumimoji="0" lang="en-US" altLang="en-US" sz="2000" b="0" i="0" u="none" strike="noStrike" cap="none" normalizeH="0" baseline="0" dirty="0">
-                <a:ln>
-                  <a:noFill/>
-                </a:ln>
-                <a:solidFill>
-                  <a:srgbClr val="BABABA"/>
-                </a:solidFill>
-                <a:effectLst/>
-                <a:latin typeface="JetBrains Mono"/>
-              </a:rPr>
-              <a:t>value</a:t>
-            </a:r>
-            <a:r>
-              <a:rPr kumimoji="0" lang="en-US" altLang="en-US" sz="2000" b="0" i="0" u="none" strike="noStrike" cap="none" normalizeH="0" baseline="0" dirty="0">
-                <a:ln>
-                  <a:noFill/>
-                </a:ln>
-                <a:solidFill>
-                  <a:srgbClr val="6A8759"/>
-                </a:solidFill>
-                <a:effectLst/>
-                <a:latin typeface="JetBrains Mono"/>
-              </a:rPr>
-              <a:t>="</a:t>
-            </a:r>
-            <a:r>
-              <a:rPr kumimoji="0" lang="en-US" altLang="en-US" sz="2000" b="0" i="0" u="none" strike="noStrike" cap="none" normalizeH="0" baseline="0" dirty="0" err="1">
-                <a:ln>
-                  <a:noFill/>
-                </a:ln>
-                <a:solidFill>
-                  <a:srgbClr val="6A8759"/>
-                </a:solidFill>
-                <a:effectLst/>
-                <a:latin typeface="JetBrains Mono"/>
-              </a:rPr>
-              <a:t>Barsik</a:t>
-            </a:r>
-            <a:r>
-              <a:rPr kumimoji="0" lang="en-US" altLang="en-US" sz="2000" b="0" i="0" u="none" strike="noStrike" cap="none" normalizeH="0" baseline="0" dirty="0">
-                <a:ln>
-                  <a:noFill/>
-                </a:ln>
-                <a:solidFill>
-                  <a:srgbClr val="6A8759"/>
-                </a:solidFill>
-                <a:effectLst/>
-                <a:latin typeface="JetBrains Mono"/>
-              </a:rPr>
-              <a:t>"</a:t>
-            </a:r>
-            <a:r>
-              <a:rPr kumimoji="0" lang="en-US" altLang="en-US" sz="2000" b="0" i="0" u="none" strike="noStrike" cap="none" normalizeH="0" baseline="0" dirty="0">
-                <a:ln>
-                  <a:noFill/>
-                </a:ln>
-                <a:solidFill>
-                  <a:srgbClr val="E8BF6A"/>
-                </a:solidFill>
-                <a:effectLst/>
-                <a:latin typeface="JetBrains Mono"/>
-              </a:rPr>
-              <a:t>/&gt;</a:t>
-            </a:r>
-            <a:br>
-              <a:rPr kumimoji="0" lang="en-US" altLang="en-US" sz="2000" b="0" i="0" u="none" strike="noStrike" cap="none" normalizeH="0" baseline="0" dirty="0">
-                <a:ln>
-                  <a:noFill/>
-                </a:ln>
-                <a:solidFill>
-                  <a:srgbClr val="E8BF6A"/>
-                </a:solidFill>
-                <a:effectLst/>
-                <a:latin typeface="JetBrains Mono"/>
-              </a:rPr>
-            </a:br>
-            <a:r>
-              <a:rPr kumimoji="0" lang="en-US" altLang="en-US" sz="2000" b="0" i="0" u="none" strike="noStrike" cap="none" normalizeH="0" baseline="0" dirty="0">
-                <a:ln>
-                  <a:noFill/>
-                </a:ln>
-                <a:solidFill>
-                  <a:srgbClr val="E8BF6A"/>
-                </a:solidFill>
-                <a:effectLst/>
-                <a:latin typeface="JetBrains Mono"/>
-              </a:rPr>
-              <a:t>    &lt;constructor-</a:t>
-            </a:r>
-            <a:r>
-              <a:rPr kumimoji="0" lang="en-US" altLang="en-US" sz="2000" b="0" i="0" u="none" strike="noStrike" cap="none" normalizeH="0" baseline="0" dirty="0" err="1">
-                <a:ln>
-                  <a:noFill/>
-                </a:ln>
-                <a:solidFill>
-                  <a:srgbClr val="E8BF6A"/>
-                </a:solidFill>
-                <a:effectLst/>
-                <a:latin typeface="JetBrains Mono"/>
-              </a:rPr>
-              <a:t>arg</a:t>
-            </a:r>
-            <a:r>
-              <a:rPr kumimoji="0" lang="en-US" altLang="en-US" sz="2000" b="0" i="0" u="none" strike="noStrike" cap="none" normalizeH="0" baseline="0" dirty="0">
-                <a:ln>
-                  <a:noFill/>
-                </a:ln>
-                <a:solidFill>
-                  <a:srgbClr val="E8BF6A"/>
-                </a:solidFill>
-                <a:effectLst/>
-                <a:latin typeface="JetBrains Mono"/>
-              </a:rPr>
-              <a:t> </a:t>
-            </a:r>
-            <a:r>
-              <a:rPr kumimoji="0" lang="en-US" altLang="en-US" sz="2000" b="0" i="0" u="none" strike="noStrike" cap="none" normalizeH="0" baseline="0" dirty="0">
-                <a:ln>
-                  <a:noFill/>
-                </a:ln>
-                <a:solidFill>
-                  <a:srgbClr val="BABABA"/>
-                </a:solidFill>
-                <a:effectLst/>
-                <a:latin typeface="JetBrains Mono"/>
-              </a:rPr>
-              <a:t>name</a:t>
-            </a:r>
-            <a:r>
-              <a:rPr kumimoji="0" lang="en-US" altLang="en-US" sz="2000" b="0" i="0" u="none" strike="noStrike" cap="none" normalizeH="0" baseline="0" dirty="0">
-                <a:ln>
-                  <a:noFill/>
-                </a:ln>
-                <a:solidFill>
-                  <a:srgbClr val="6A8759"/>
-                </a:solidFill>
-                <a:effectLst/>
-                <a:latin typeface="JetBrains Mono"/>
-              </a:rPr>
-              <a:t>="owner" </a:t>
-            </a:r>
-            <a:r>
-              <a:rPr kumimoji="0" lang="en-US" altLang="en-US" sz="2000" b="0" i="0" u="none" strike="noStrike" cap="none" normalizeH="0" baseline="0" dirty="0">
-                <a:ln>
-                  <a:noFill/>
-                </a:ln>
-                <a:solidFill>
-                  <a:srgbClr val="BABABA"/>
-                </a:solidFill>
-                <a:effectLst/>
-                <a:latin typeface="JetBrains Mono"/>
-              </a:rPr>
-              <a:t>ref</a:t>
-            </a:r>
-            <a:r>
-              <a:rPr kumimoji="0" lang="en-US" altLang="en-US" sz="2000" b="0" i="0" u="none" strike="noStrike" cap="none" normalizeH="0" baseline="0" dirty="0">
-                <a:ln>
-                  <a:noFill/>
-                </a:ln>
-                <a:solidFill>
-                  <a:srgbClr val="6A8759"/>
-                </a:solidFill>
-                <a:effectLst/>
-                <a:latin typeface="JetBrains Mono"/>
-              </a:rPr>
-              <a:t>="person"</a:t>
-            </a:r>
-            <a:r>
-              <a:rPr kumimoji="0" lang="en-US" altLang="en-US" sz="2000" b="0" i="0" u="none" strike="noStrike" cap="none" normalizeH="0" baseline="0" dirty="0">
-                <a:ln>
-                  <a:noFill/>
-                </a:ln>
-                <a:solidFill>
-                  <a:srgbClr val="E8BF6A"/>
-                </a:solidFill>
-                <a:effectLst/>
-                <a:latin typeface="JetBrains Mono"/>
-              </a:rPr>
-              <a:t>/&gt;</a:t>
-            </a:r>
-            <a:br>
-              <a:rPr kumimoji="0" lang="en-US" altLang="en-US" sz="2000" b="0" i="0" u="none" strike="noStrike" cap="none" normalizeH="0" baseline="0" dirty="0">
-                <a:ln>
-                  <a:noFill/>
-                </a:ln>
-                <a:solidFill>
-                  <a:srgbClr val="E8BF6A"/>
-                </a:solidFill>
-                <a:effectLst/>
-                <a:latin typeface="JetBrains Mono"/>
-              </a:rPr>
-            </a:br>
-            <a:r>
-              <a:rPr kumimoji="0" lang="en-US" altLang="en-US" sz="2000" b="0" i="0" u="none" strike="noStrike" cap="none" normalizeH="0" baseline="0" dirty="0">
-                <a:ln>
-                  <a:noFill/>
-                </a:ln>
-                <a:solidFill>
-                  <a:srgbClr val="E8BF6A"/>
-                </a:solidFill>
-                <a:effectLst/>
-                <a:latin typeface="JetBrains Mono"/>
-              </a:rPr>
-              <a:t>&lt;/bean&gt;</a:t>
-            </a:r>
-            <a:endParaRPr kumimoji="0" lang="en-US" altLang="en-US" sz="2000" b="0" i="0" u="none" strike="noStrike" cap="none" normalizeH="0" baseline="0" dirty="0">
+              <a:t>;</a:t>
+            </a:r>
+            <a:endParaRPr kumimoji="0" lang="en-US" altLang="en-US" sz="2000" b="0" i="0" u="none" strike="noStrike" cap="none" normalizeH="0" baseline="0" dirty="0" smtClean="0">
               <a:ln>
                 <a:noFill/>
               </a:ln>
@@ -4403,10 +4104,847 @@
           </a:p>
         </p:txBody>
       </p:sp>
+      <p:sp>
+        <p:nvSpPr>
+          <p:cNvPr id="4" name="Rectangle 2"/>
+          <p:cNvSpPr>
+            <a:spLocks noChangeArrowheads="1"/>
+          </p:cNvSpPr>
+          <p:nvPr/>
+        </p:nvSpPr>
+        <p:spPr bwMode="auto">
+          <a:xfrm>
+            <a:off x="5183195" y="2375659"/>
+            <a:ext cx="6037255" cy="1323439"/>
+          </a:xfrm>
+          <a:prstGeom prst="rect">
+            <a:avLst/>
+          </a:prstGeom>
+          <a:solidFill>
+            <a:srgbClr val="2B2B2B"/>
+          </a:solidFill>
+          <a:ln>
+            <a:noFill/>
+          </a:ln>
+          <a:effectLst/>
+          <a:extLst>
+            <a:ext uri="{91240B29-F687-4F45-9708-019B960494DF}">
+              <a14:hiddenLine xmlns:a14="http://schemas.microsoft.com/office/drawing/2010/main" w="9525">
+                <a:solidFill>
+                  <a:schemeClr val="tx1"/>
+                </a:solidFill>
+                <a:miter lim="800000"/>
+                <a:headEnd/>
+                <a:tailEnd/>
+              </a14:hiddenLine>
+            </a:ext>
+            <a:ext uri="{AF507438-7753-43E0-B8FC-AC1667EBCBE1}">
+              <a14:hiddenEffects xmlns:a14="http://schemas.microsoft.com/office/drawing/2010/main">
+                <a:effectLst>
+                  <a:outerShdw dist="35921" dir="2700000" algn="ctr" rotWithShape="0">
+                    <a:schemeClr val="bg2"/>
+                  </a:outerShdw>
+                </a:effectLst>
+              </a14:hiddenEffects>
+            </a:ext>
+          </a:extLst>
+        </p:spPr>
+        <p:txBody>
+          <a:bodyPr vert="horz" wrap="square" lIns="91440" tIns="45720" rIns="91440" bIns="45720" numCol="1" anchor="ctr" anchorCtr="0" compatLnSpc="1">
+            <a:prstTxWarp prst="textNoShape">
+              <a:avLst/>
+            </a:prstTxWarp>
+            <a:spAutoFit/>
+          </a:bodyPr>
+          <a:lstStyle/>
+          <a:p>
+            <a:pPr marL="0" marR="0" lvl="0" indent="0" algn="l" defTabSz="914400" rtl="0" eaLnBrk="0" fontAlgn="base" latinLnBrk="0" hangingPunct="0">
+              <a:lnSpc>
+                <a:spcPct val="100000"/>
+              </a:lnSpc>
+              <a:spcBef>
+                <a:spcPct val="0"/>
+              </a:spcBef>
+              <a:spcAft>
+                <a:spcPct val="0"/>
+              </a:spcAft>
+              <a:buClrTx/>
+              <a:buSzTx/>
+              <a:buFontTx/>
+              <a:buNone/>
+              <a:tabLst/>
+            </a:pPr>
+            <a:r>
+              <a:rPr kumimoji="0" lang="en-US" altLang="en-US" sz="2000" b="0" i="0" u="none" strike="noStrike" cap="none" normalizeH="0" baseline="0" dirty="0" smtClean="0">
+                <a:ln>
+                  <a:noFill/>
+                </a:ln>
+                <a:solidFill>
+                  <a:srgbClr val="E8BF6A"/>
+                </a:solidFill>
+                <a:effectLst/>
+                <a:latin typeface="JetBrains Mono"/>
+              </a:rPr>
+              <a:t>&lt;bean </a:t>
+            </a:r>
+            <a:r>
+              <a:rPr kumimoji="0" lang="en-US" altLang="en-US" sz="2000" b="0" i="0" u="none" strike="noStrike" cap="none" normalizeH="0" baseline="0" dirty="0" smtClean="0">
+                <a:ln>
+                  <a:noFill/>
+                </a:ln>
+                <a:solidFill>
+                  <a:srgbClr val="BABABA"/>
+                </a:solidFill>
+                <a:effectLst/>
+                <a:latin typeface="JetBrains Mono"/>
+              </a:rPr>
+              <a:t>id</a:t>
+            </a:r>
+            <a:r>
+              <a:rPr kumimoji="0" lang="en-US" altLang="en-US" sz="2000" b="0" i="0" u="none" strike="noStrike" cap="none" normalizeH="0" baseline="0" dirty="0" smtClean="0">
+                <a:ln>
+                  <a:noFill/>
+                </a:ln>
+                <a:solidFill>
+                  <a:srgbClr val="6A8759"/>
+                </a:solidFill>
+                <a:effectLst/>
+                <a:latin typeface="JetBrains Mono"/>
+              </a:rPr>
+              <a:t>="</a:t>
+            </a:r>
+            <a:r>
+              <a:rPr kumimoji="0" lang="en-US" altLang="en-US" sz="2000" b="0" i="0" u="none" strike="noStrike" cap="none" normalizeH="0" baseline="0" dirty="0" err="1" smtClean="0">
+                <a:ln>
+                  <a:noFill/>
+                </a:ln>
+                <a:solidFill>
+                  <a:srgbClr val="6A8759"/>
+                </a:solidFill>
+                <a:effectLst/>
+                <a:latin typeface="JetBrains Mono"/>
+              </a:rPr>
+              <a:t>petPerson</a:t>
+            </a:r>
+            <a:r>
+              <a:rPr kumimoji="0" lang="en-US" altLang="en-US" sz="2000" b="0" i="0" u="none" strike="noStrike" cap="none" normalizeH="0" baseline="0" dirty="0" smtClean="0">
+                <a:ln>
+                  <a:noFill/>
+                </a:ln>
+                <a:solidFill>
+                  <a:srgbClr val="6A8759"/>
+                </a:solidFill>
+                <a:effectLst/>
+                <a:latin typeface="JetBrains Mono"/>
+              </a:rPr>
+              <a:t>" </a:t>
+            </a:r>
+            <a:r>
+              <a:rPr kumimoji="0" lang="en-US" altLang="en-US" sz="2000" b="0" i="0" u="none" strike="noStrike" cap="none" normalizeH="0" baseline="0" dirty="0" smtClean="0">
+                <a:ln>
+                  <a:noFill/>
+                </a:ln>
+                <a:solidFill>
+                  <a:srgbClr val="BABABA"/>
+                </a:solidFill>
+                <a:effectLst/>
+                <a:latin typeface="JetBrains Mono"/>
+              </a:rPr>
+              <a:t>class</a:t>
+            </a:r>
+            <a:r>
+              <a:rPr kumimoji="0" lang="en-US" altLang="en-US" sz="2000" b="0" i="0" u="none" strike="noStrike" cap="none" normalizeH="0" baseline="0" dirty="0" smtClean="0">
+                <a:ln>
+                  <a:noFill/>
+                </a:ln>
+                <a:solidFill>
+                  <a:srgbClr val="6A8759"/>
+                </a:solidFill>
+                <a:effectLst/>
+                <a:latin typeface="JetBrains Mono"/>
+              </a:rPr>
+              <a:t>="com.volkov.IoC.example13.PetPerson"</a:t>
+            </a:r>
+            <a:br>
+              <a:rPr kumimoji="0" lang="en-US" altLang="en-US" sz="2000" b="0" i="0" u="none" strike="noStrike" cap="none" normalizeH="0" baseline="0" dirty="0" smtClean="0">
+                <a:ln>
+                  <a:noFill/>
+                </a:ln>
+                <a:solidFill>
+                  <a:srgbClr val="6A8759"/>
+                </a:solidFill>
+                <a:effectLst/>
+                <a:latin typeface="JetBrains Mono"/>
+              </a:rPr>
+            </a:br>
+            <a:r>
+              <a:rPr kumimoji="0" lang="en-US" altLang="en-US" sz="2000" b="0" i="0" u="none" strike="noStrike" cap="none" normalizeH="0" baseline="0" dirty="0" smtClean="0">
+                <a:ln>
+                  <a:noFill/>
+                </a:ln>
+                <a:solidFill>
+                  <a:srgbClr val="6A8759"/>
+                </a:solidFill>
+                <a:effectLst/>
+                <a:latin typeface="JetBrains Mono"/>
+              </a:rPr>
+              <a:t>    </a:t>
+            </a:r>
+            <a:r>
+              <a:rPr kumimoji="0" lang="en-US" altLang="en-US" sz="2000" b="0" i="0" u="none" strike="noStrike" cap="none" normalizeH="0" baseline="0" dirty="0" err="1" smtClean="0">
+                <a:ln>
+                  <a:noFill/>
+                </a:ln>
+                <a:solidFill>
+                  <a:srgbClr val="BABABA"/>
+                </a:solidFill>
+                <a:effectLst/>
+                <a:latin typeface="JetBrains Mono"/>
+              </a:rPr>
+              <a:t>autowire</a:t>
+            </a:r>
+            <a:r>
+              <a:rPr kumimoji="0" lang="en-US" altLang="en-US" sz="2000" b="0" i="0" u="none" strike="noStrike" cap="none" normalizeH="0" baseline="0" dirty="0" smtClean="0">
+                <a:ln>
+                  <a:noFill/>
+                </a:ln>
+                <a:solidFill>
+                  <a:srgbClr val="6A8759"/>
+                </a:solidFill>
+                <a:effectLst/>
+                <a:latin typeface="JetBrains Mono"/>
+              </a:rPr>
+              <a:t>="</a:t>
+            </a:r>
+            <a:r>
+              <a:rPr kumimoji="0" lang="en-US" altLang="en-US" sz="2000" b="0" i="0" u="none" strike="noStrike" cap="none" normalizeH="0" baseline="0" dirty="0" err="1" smtClean="0">
+                <a:ln>
+                  <a:noFill/>
+                </a:ln>
+                <a:solidFill>
+                  <a:srgbClr val="6A8759"/>
+                </a:solidFill>
+                <a:effectLst/>
+                <a:latin typeface="JetBrains Mono"/>
+              </a:rPr>
+              <a:t>byName</a:t>
+            </a:r>
+            <a:r>
+              <a:rPr kumimoji="0" lang="en-US" altLang="en-US" sz="2000" b="0" i="0" u="none" strike="noStrike" cap="none" normalizeH="0" baseline="0" dirty="0" smtClean="0">
+                <a:ln>
+                  <a:noFill/>
+                </a:ln>
+                <a:solidFill>
+                  <a:srgbClr val="6A8759"/>
+                </a:solidFill>
+                <a:effectLst/>
+                <a:latin typeface="JetBrains Mono"/>
+              </a:rPr>
+              <a:t>"</a:t>
+            </a:r>
+            <a:r>
+              <a:rPr kumimoji="0" lang="en-US" altLang="en-US" sz="2000" b="0" i="0" u="none" strike="noStrike" cap="none" normalizeH="0" baseline="0" dirty="0" smtClean="0">
+                <a:ln>
+                  <a:noFill/>
+                </a:ln>
+                <a:solidFill>
+                  <a:srgbClr val="E8BF6A"/>
+                </a:solidFill>
+                <a:effectLst/>
+                <a:latin typeface="JetBrains Mono"/>
+              </a:rPr>
+              <a:t>&gt;</a:t>
+            </a:r>
+            <a:br>
+              <a:rPr kumimoji="0" lang="en-US" altLang="en-US" sz="2000" b="0" i="0" u="none" strike="noStrike" cap="none" normalizeH="0" baseline="0" dirty="0" smtClean="0">
+                <a:ln>
+                  <a:noFill/>
+                </a:ln>
+                <a:solidFill>
+                  <a:srgbClr val="E8BF6A"/>
+                </a:solidFill>
+                <a:effectLst/>
+                <a:latin typeface="JetBrains Mono"/>
+              </a:rPr>
+            </a:br>
+            <a:r>
+              <a:rPr kumimoji="0" lang="en-US" altLang="en-US" sz="2000" b="0" i="0" u="none" strike="noStrike" cap="none" normalizeH="0" baseline="0" dirty="0" smtClean="0">
+                <a:ln>
+                  <a:noFill/>
+                </a:ln>
+                <a:solidFill>
+                  <a:srgbClr val="E8BF6A"/>
+                </a:solidFill>
+                <a:effectLst/>
+                <a:latin typeface="JetBrains Mono"/>
+              </a:rPr>
+              <a:t>&lt;/bean&gt;</a:t>
+            </a:r>
+            <a:endParaRPr kumimoji="0" lang="en-US" altLang="en-US" sz="2000" b="0" i="0" u="none" strike="noStrike" cap="none" normalizeH="0" baseline="0" dirty="0" smtClean="0">
+              <a:ln>
+                <a:noFill/>
+              </a:ln>
+              <a:solidFill>
+                <a:schemeClr val="tx1"/>
+              </a:solidFill>
+              <a:effectLst/>
+              <a:latin typeface="Arial" panose="020B0604020202020204" pitchFamily="34" charset="0"/>
+            </a:endParaRPr>
+          </a:p>
+        </p:txBody>
+      </p:sp>
     </p:spTree>
     <p:extLst>
       <p:ext uri="{BB962C8B-B14F-4D97-AF65-F5344CB8AC3E}">
-        <p14:creationId xmlns:p14="http://schemas.microsoft.com/office/powerpoint/2010/main" val="1965342830"/>
+        <p14:creationId xmlns:p14="http://schemas.microsoft.com/office/powerpoint/2010/main" val="2083790997"/>
+      </p:ext>
+    </p:extLst>
+  </p:cSld>
+  <p:clrMapOvr>
+    <a:masterClrMapping/>
+  </p:clrMapOvr>
+</p:sld>
+</file>
+
+<file path=ppt/slides/slide5.xml><?xml version="1.0" encoding="utf-8"?>
+<p:sld xmlns:a="http://schemas.openxmlformats.org/drawingml/2006/main" xmlns:r="http://schemas.openxmlformats.org/officeDocument/2006/relationships" xmlns:p="http://schemas.openxmlformats.org/presentationml/2006/main">
+  <p:cSld>
+    <p:spTree>
+      <p:nvGrpSpPr>
+        <p:cNvPr id="1" name=""/>
+        <p:cNvGrpSpPr/>
+        <p:nvPr/>
+      </p:nvGrpSpPr>
+      <p:grpSpPr>
+        <a:xfrm>
+          <a:off x="0" y="0"/>
+          <a:ext cx="0" cy="0"/>
+          <a:chOff x="0" y="0"/>
+          <a:chExt cx="0" cy="0"/>
+        </a:xfrm>
+      </p:grpSpPr>
+      <p:sp>
+        <p:nvSpPr>
+          <p:cNvPr id="3" name="Content Placeholder 2"/>
+          <p:cNvSpPr>
+            <a:spLocks noGrp="1"/>
+          </p:cNvSpPr>
+          <p:nvPr>
+            <p:ph idx="1"/>
+          </p:nvPr>
+        </p:nvSpPr>
+        <p:spPr>
+          <a:xfrm>
+            <a:off x="838200" y="619125"/>
+            <a:ext cx="10515600" cy="5557838"/>
+          </a:xfrm>
+        </p:spPr>
+        <p:txBody>
+          <a:bodyPr/>
+          <a:lstStyle/>
+          <a:p>
+            <a:pPr marL="0" indent="0">
+              <a:buNone/>
+            </a:pPr>
+            <a:r>
+              <a:rPr lang="ru-RU" dirty="0" smtClean="0"/>
+              <a:t>Т.е. если мы поменяем имя переменной на </a:t>
+            </a:r>
+            <a:r>
+              <a:rPr lang="en-US" dirty="0" smtClean="0"/>
+              <a:t>animal1</a:t>
+            </a:r>
+          </a:p>
+          <a:p>
+            <a:endParaRPr lang="en-US" dirty="0"/>
+          </a:p>
+          <a:p>
+            <a:endParaRPr lang="en-US" dirty="0" smtClean="0"/>
+          </a:p>
+          <a:p>
+            <a:endParaRPr lang="en-US" dirty="0"/>
+          </a:p>
+          <a:p>
+            <a:endParaRPr lang="en-US" dirty="0" smtClean="0"/>
+          </a:p>
+          <a:p>
+            <a:pPr marL="0" indent="0">
+              <a:buNone/>
+            </a:pPr>
+            <a:r>
+              <a:rPr lang="ru-RU" dirty="0" smtClean="0"/>
+              <a:t>Связывания всё равно не произойдёт, потому что имя = названию класса (только с маленькой буквы).</a:t>
+            </a:r>
+            <a:endParaRPr lang="en-US" dirty="0"/>
+          </a:p>
+        </p:txBody>
+      </p:sp>
+      <p:sp>
+        <p:nvSpPr>
+          <p:cNvPr id="4" name="Rectangle 1"/>
+          <p:cNvSpPr>
+            <a:spLocks noChangeArrowheads="1"/>
+          </p:cNvSpPr>
+          <p:nvPr/>
+        </p:nvSpPr>
+        <p:spPr bwMode="auto">
+          <a:xfrm>
+            <a:off x="838200" y="1284357"/>
+            <a:ext cx="2935419" cy="707886"/>
+          </a:xfrm>
+          <a:prstGeom prst="rect">
+            <a:avLst/>
+          </a:prstGeom>
+          <a:solidFill>
+            <a:srgbClr val="2B2B2B"/>
+          </a:solidFill>
+          <a:ln>
+            <a:noFill/>
+          </a:ln>
+          <a:effectLst/>
+          <a:extLst>
+            <a:ext uri="{91240B29-F687-4F45-9708-019B960494DF}">
+              <a14:hiddenLine xmlns:a14="http://schemas.microsoft.com/office/drawing/2010/main" w="9525">
+                <a:solidFill>
+                  <a:schemeClr val="tx1"/>
+                </a:solidFill>
+                <a:miter lim="800000"/>
+                <a:headEnd/>
+                <a:tailEnd/>
+              </a14:hiddenLine>
+            </a:ext>
+            <a:ext uri="{AF507438-7753-43E0-B8FC-AC1667EBCBE1}">
+              <a14:hiddenEffects xmlns:a14="http://schemas.microsoft.com/office/drawing/2010/main">
+                <a:effectLst>
+                  <a:outerShdw dist="35921" dir="2700000" algn="ctr" rotWithShape="0">
+                    <a:schemeClr val="bg2"/>
+                  </a:outerShdw>
+                </a:effectLst>
+              </a14:hiddenEffects>
+            </a:ext>
+          </a:extLst>
+        </p:spPr>
+        <p:txBody>
+          <a:bodyPr vert="horz" wrap="none" lIns="91440" tIns="45720" rIns="91440" bIns="45720" numCol="1" anchor="ctr" anchorCtr="0" compatLnSpc="1">
+            <a:prstTxWarp prst="textNoShape">
+              <a:avLst/>
+            </a:prstTxWarp>
+            <a:spAutoFit/>
+          </a:bodyPr>
+          <a:lstStyle/>
+          <a:p>
+            <a:pPr marL="0" marR="0" lvl="0" indent="0" algn="l" defTabSz="914400" rtl="0" eaLnBrk="0" fontAlgn="base" latinLnBrk="0" hangingPunct="0">
+              <a:lnSpc>
+                <a:spcPct val="100000"/>
+              </a:lnSpc>
+              <a:spcBef>
+                <a:spcPct val="0"/>
+              </a:spcBef>
+              <a:spcAft>
+                <a:spcPct val="0"/>
+              </a:spcAft>
+              <a:buClrTx/>
+              <a:buSzTx/>
+              <a:buFontTx/>
+              <a:buNone/>
+              <a:tabLst/>
+            </a:pPr>
+            <a:r>
+              <a:rPr kumimoji="0" lang="en-US" altLang="en-US" sz="2000" b="0" i="0" u="none" strike="noStrike" cap="none" normalizeH="0" baseline="0" dirty="0" smtClean="0">
+                <a:ln>
+                  <a:noFill/>
+                </a:ln>
+                <a:solidFill>
+                  <a:srgbClr val="CC7832"/>
+                </a:solidFill>
+                <a:effectLst/>
+                <a:latin typeface="JetBrains Mono"/>
+              </a:rPr>
+              <a:t>public class </a:t>
+            </a:r>
+            <a:r>
+              <a:rPr kumimoji="0" lang="en-US" altLang="en-US" sz="2000" b="0" i="0" u="none" strike="noStrike" cap="none" normalizeH="0" baseline="0" dirty="0" err="1" smtClean="0">
+                <a:ln>
+                  <a:noFill/>
+                </a:ln>
+                <a:solidFill>
+                  <a:srgbClr val="A9B7C6"/>
+                </a:solidFill>
+                <a:effectLst/>
+                <a:latin typeface="JetBrains Mono"/>
+              </a:rPr>
+              <a:t>PetPerson</a:t>
+            </a:r>
+            <a:r>
+              <a:rPr kumimoji="0" lang="en-US" altLang="en-US" sz="2000" b="0" i="0" u="none" strike="noStrike" cap="none" normalizeH="0" baseline="0" dirty="0" smtClean="0">
+                <a:ln>
+                  <a:noFill/>
+                </a:ln>
+                <a:solidFill>
+                  <a:srgbClr val="A9B7C6"/>
+                </a:solidFill>
+                <a:effectLst/>
+                <a:latin typeface="JetBrains Mono"/>
+              </a:rPr>
+              <a:t> {</a:t>
+            </a:r>
+            <a:br>
+              <a:rPr kumimoji="0" lang="en-US" altLang="en-US" sz="2000" b="0" i="0" u="none" strike="noStrike" cap="none" normalizeH="0" baseline="0" dirty="0" smtClean="0">
+                <a:ln>
+                  <a:noFill/>
+                </a:ln>
+                <a:solidFill>
+                  <a:srgbClr val="A9B7C6"/>
+                </a:solidFill>
+                <a:effectLst/>
+                <a:latin typeface="JetBrains Mono"/>
+              </a:rPr>
+            </a:br>
+            <a:r>
+              <a:rPr kumimoji="0" lang="en-US" altLang="en-US" sz="2000" b="0" i="0" u="none" strike="noStrike" cap="none" normalizeH="0" baseline="0" dirty="0" smtClean="0">
+                <a:ln>
+                  <a:noFill/>
+                </a:ln>
+                <a:solidFill>
+                  <a:srgbClr val="A9B7C6"/>
+                </a:solidFill>
+                <a:effectLst/>
+                <a:latin typeface="JetBrains Mono"/>
+              </a:rPr>
+              <a:t>    Animal </a:t>
+            </a:r>
+            <a:r>
+              <a:rPr kumimoji="0" lang="en-US" altLang="en-US" sz="2000" b="0" i="0" u="none" strike="noStrike" cap="none" normalizeH="0" baseline="0" dirty="0" smtClean="0">
+                <a:ln>
+                  <a:noFill/>
+                </a:ln>
+                <a:solidFill>
+                  <a:srgbClr val="9876AA"/>
+                </a:solidFill>
+                <a:effectLst/>
+                <a:latin typeface="JetBrains Mono"/>
+              </a:rPr>
+              <a:t>animal1</a:t>
+            </a:r>
+            <a:r>
+              <a:rPr kumimoji="0" lang="en-US" altLang="en-US" sz="2000" b="0" i="0" u="none" strike="noStrike" cap="none" normalizeH="0" baseline="0" dirty="0" smtClean="0">
+                <a:ln>
+                  <a:noFill/>
+                </a:ln>
+                <a:solidFill>
+                  <a:srgbClr val="CC7832"/>
+                </a:solidFill>
+                <a:effectLst/>
+                <a:latin typeface="JetBrains Mono"/>
+              </a:rPr>
+              <a:t>;</a:t>
+            </a:r>
+            <a:endParaRPr kumimoji="0" lang="en-US" altLang="en-US" sz="2000" b="0" i="0" u="none" strike="noStrike" cap="none" normalizeH="0" baseline="0" dirty="0" smtClean="0">
+              <a:ln>
+                <a:noFill/>
+              </a:ln>
+              <a:solidFill>
+                <a:schemeClr val="tx1"/>
+              </a:solidFill>
+              <a:effectLst/>
+              <a:latin typeface="Arial" panose="020B0604020202020204" pitchFamily="34" charset="0"/>
+            </a:endParaRPr>
+          </a:p>
+        </p:txBody>
+      </p:sp>
+      <p:sp>
+        <p:nvSpPr>
+          <p:cNvPr id="5" name="Rectangle 2"/>
+          <p:cNvSpPr>
+            <a:spLocks noChangeArrowheads="1"/>
+          </p:cNvSpPr>
+          <p:nvPr/>
+        </p:nvSpPr>
+        <p:spPr bwMode="auto">
+          <a:xfrm>
+            <a:off x="4524375" y="1284357"/>
+            <a:ext cx="5762625" cy="1323439"/>
+          </a:xfrm>
+          <a:prstGeom prst="rect">
+            <a:avLst/>
+          </a:prstGeom>
+          <a:solidFill>
+            <a:srgbClr val="2B2B2B"/>
+          </a:solidFill>
+          <a:ln>
+            <a:noFill/>
+          </a:ln>
+          <a:effectLst/>
+          <a:extLst>
+            <a:ext uri="{91240B29-F687-4F45-9708-019B960494DF}">
+              <a14:hiddenLine xmlns:a14="http://schemas.microsoft.com/office/drawing/2010/main" w="9525">
+                <a:solidFill>
+                  <a:schemeClr val="tx1"/>
+                </a:solidFill>
+                <a:miter lim="800000"/>
+                <a:headEnd/>
+                <a:tailEnd/>
+              </a14:hiddenLine>
+            </a:ext>
+            <a:ext uri="{AF507438-7753-43E0-B8FC-AC1667EBCBE1}">
+              <a14:hiddenEffects xmlns:a14="http://schemas.microsoft.com/office/drawing/2010/main">
+                <a:effectLst>
+                  <a:outerShdw dist="35921" dir="2700000" algn="ctr" rotWithShape="0">
+                    <a:schemeClr val="bg2"/>
+                  </a:outerShdw>
+                </a:effectLst>
+              </a14:hiddenEffects>
+            </a:ext>
+          </a:extLst>
+        </p:spPr>
+        <p:txBody>
+          <a:bodyPr vert="horz" wrap="square" lIns="91440" tIns="45720" rIns="91440" bIns="45720" numCol="1" anchor="ctr" anchorCtr="0" compatLnSpc="1">
+            <a:prstTxWarp prst="textNoShape">
+              <a:avLst/>
+            </a:prstTxWarp>
+            <a:spAutoFit/>
+          </a:bodyPr>
+          <a:lstStyle/>
+          <a:p>
+            <a:pPr marL="0" marR="0" lvl="0" indent="0" algn="l" defTabSz="914400" rtl="0" eaLnBrk="0" fontAlgn="base" latinLnBrk="0" hangingPunct="0">
+              <a:lnSpc>
+                <a:spcPct val="100000"/>
+              </a:lnSpc>
+              <a:spcBef>
+                <a:spcPct val="0"/>
+              </a:spcBef>
+              <a:spcAft>
+                <a:spcPct val="0"/>
+              </a:spcAft>
+              <a:buClrTx/>
+              <a:buSzTx/>
+              <a:buFontTx/>
+              <a:buNone/>
+              <a:tabLst/>
+            </a:pPr>
+            <a:r>
+              <a:rPr kumimoji="0" lang="en-US" altLang="en-US" sz="2000" b="0" i="0" u="none" strike="noStrike" cap="none" normalizeH="0" baseline="0" dirty="0" smtClean="0">
+                <a:ln>
+                  <a:noFill/>
+                </a:ln>
+                <a:solidFill>
+                  <a:srgbClr val="E8BF6A"/>
+                </a:solidFill>
+                <a:effectLst/>
+                <a:latin typeface="JetBrains Mono"/>
+              </a:rPr>
+              <a:t>&lt;bean </a:t>
+            </a:r>
+            <a:r>
+              <a:rPr kumimoji="0" lang="en-US" altLang="en-US" sz="2000" b="0" i="0" u="none" strike="noStrike" cap="none" normalizeH="0" baseline="0" dirty="0" smtClean="0">
+                <a:ln>
+                  <a:noFill/>
+                </a:ln>
+                <a:solidFill>
+                  <a:srgbClr val="BABABA"/>
+                </a:solidFill>
+                <a:effectLst/>
+                <a:latin typeface="JetBrains Mono"/>
+              </a:rPr>
+              <a:t>id</a:t>
+            </a:r>
+            <a:r>
+              <a:rPr kumimoji="0" lang="en-US" altLang="en-US" sz="2000" b="0" i="0" u="none" strike="noStrike" cap="none" normalizeH="0" baseline="0" dirty="0" smtClean="0">
+                <a:ln>
+                  <a:noFill/>
+                </a:ln>
+                <a:solidFill>
+                  <a:srgbClr val="6A8759"/>
+                </a:solidFill>
+                <a:effectLst/>
+                <a:latin typeface="JetBrains Mono"/>
+              </a:rPr>
+              <a:t>="</a:t>
+            </a:r>
+            <a:r>
+              <a:rPr kumimoji="0" lang="en-US" altLang="en-US" sz="2000" b="0" i="0" u="none" strike="noStrike" cap="none" normalizeH="0" baseline="0" dirty="0" err="1" smtClean="0">
+                <a:ln>
+                  <a:noFill/>
+                </a:ln>
+                <a:solidFill>
+                  <a:srgbClr val="6A8759"/>
+                </a:solidFill>
+                <a:effectLst/>
+                <a:latin typeface="JetBrains Mono"/>
+              </a:rPr>
+              <a:t>petPerson</a:t>
+            </a:r>
+            <a:r>
+              <a:rPr kumimoji="0" lang="en-US" altLang="en-US" sz="2000" b="0" i="0" u="none" strike="noStrike" cap="none" normalizeH="0" baseline="0" dirty="0" smtClean="0">
+                <a:ln>
+                  <a:noFill/>
+                </a:ln>
+                <a:solidFill>
+                  <a:srgbClr val="6A8759"/>
+                </a:solidFill>
+                <a:effectLst/>
+                <a:latin typeface="JetBrains Mono"/>
+              </a:rPr>
+              <a:t>" </a:t>
+            </a:r>
+            <a:r>
+              <a:rPr kumimoji="0" lang="en-US" altLang="en-US" sz="2000" b="0" i="0" u="none" strike="noStrike" cap="none" normalizeH="0" baseline="0" dirty="0" smtClean="0">
+                <a:ln>
+                  <a:noFill/>
+                </a:ln>
+                <a:solidFill>
+                  <a:srgbClr val="BABABA"/>
+                </a:solidFill>
+                <a:effectLst/>
+                <a:latin typeface="JetBrains Mono"/>
+              </a:rPr>
+              <a:t>class</a:t>
+            </a:r>
+            <a:r>
+              <a:rPr kumimoji="0" lang="en-US" altLang="en-US" sz="2000" b="0" i="0" u="none" strike="noStrike" cap="none" normalizeH="0" baseline="0" dirty="0" smtClean="0">
+                <a:ln>
+                  <a:noFill/>
+                </a:ln>
+                <a:solidFill>
+                  <a:srgbClr val="6A8759"/>
+                </a:solidFill>
+                <a:effectLst/>
+                <a:latin typeface="JetBrains Mono"/>
+              </a:rPr>
+              <a:t>="com.volkov.IoC.example13.PetPerson"</a:t>
+            </a:r>
+            <a:br>
+              <a:rPr kumimoji="0" lang="en-US" altLang="en-US" sz="2000" b="0" i="0" u="none" strike="noStrike" cap="none" normalizeH="0" baseline="0" dirty="0" smtClean="0">
+                <a:ln>
+                  <a:noFill/>
+                </a:ln>
+                <a:solidFill>
+                  <a:srgbClr val="6A8759"/>
+                </a:solidFill>
+                <a:effectLst/>
+                <a:latin typeface="JetBrains Mono"/>
+              </a:rPr>
+            </a:br>
+            <a:r>
+              <a:rPr kumimoji="0" lang="en-US" altLang="en-US" sz="2000" b="0" i="0" u="none" strike="noStrike" cap="none" normalizeH="0" baseline="0" dirty="0" smtClean="0">
+                <a:ln>
+                  <a:noFill/>
+                </a:ln>
+                <a:solidFill>
+                  <a:srgbClr val="6A8759"/>
+                </a:solidFill>
+                <a:effectLst/>
+                <a:latin typeface="JetBrains Mono"/>
+              </a:rPr>
+              <a:t>    </a:t>
+            </a:r>
+            <a:r>
+              <a:rPr kumimoji="0" lang="en-US" altLang="en-US" sz="2000" b="0" i="0" u="none" strike="noStrike" cap="none" normalizeH="0" baseline="0" dirty="0" err="1" smtClean="0">
+                <a:ln>
+                  <a:noFill/>
+                </a:ln>
+                <a:solidFill>
+                  <a:srgbClr val="BABABA"/>
+                </a:solidFill>
+                <a:effectLst/>
+                <a:latin typeface="JetBrains Mono"/>
+              </a:rPr>
+              <a:t>autowire</a:t>
+            </a:r>
+            <a:r>
+              <a:rPr kumimoji="0" lang="en-US" altLang="en-US" sz="2000" b="0" i="0" u="none" strike="noStrike" cap="none" normalizeH="0" baseline="0" dirty="0" smtClean="0">
+                <a:ln>
+                  <a:noFill/>
+                </a:ln>
+                <a:solidFill>
+                  <a:srgbClr val="6A8759"/>
+                </a:solidFill>
+                <a:effectLst/>
+                <a:latin typeface="JetBrains Mono"/>
+              </a:rPr>
+              <a:t>="</a:t>
+            </a:r>
+            <a:r>
+              <a:rPr kumimoji="0" lang="en-US" altLang="en-US" sz="2000" b="0" i="0" u="none" strike="noStrike" cap="none" normalizeH="0" baseline="0" dirty="0" err="1" smtClean="0">
+                <a:ln>
+                  <a:noFill/>
+                </a:ln>
+                <a:solidFill>
+                  <a:srgbClr val="6A8759"/>
+                </a:solidFill>
+                <a:effectLst/>
+                <a:latin typeface="JetBrains Mono"/>
+              </a:rPr>
+              <a:t>byName</a:t>
+            </a:r>
+            <a:r>
+              <a:rPr kumimoji="0" lang="en-US" altLang="en-US" sz="2000" b="0" i="0" u="none" strike="noStrike" cap="none" normalizeH="0" baseline="0" dirty="0" smtClean="0">
+                <a:ln>
+                  <a:noFill/>
+                </a:ln>
+                <a:solidFill>
+                  <a:srgbClr val="6A8759"/>
+                </a:solidFill>
+                <a:effectLst/>
+                <a:latin typeface="JetBrains Mono"/>
+              </a:rPr>
+              <a:t>"</a:t>
+            </a:r>
+            <a:r>
+              <a:rPr kumimoji="0" lang="en-US" altLang="en-US" sz="2000" b="0" i="0" u="none" strike="noStrike" cap="none" normalizeH="0" baseline="0" dirty="0" smtClean="0">
+                <a:ln>
+                  <a:noFill/>
+                </a:ln>
+                <a:solidFill>
+                  <a:srgbClr val="E8BF6A"/>
+                </a:solidFill>
+                <a:effectLst/>
+                <a:latin typeface="JetBrains Mono"/>
+              </a:rPr>
+              <a:t>&gt;</a:t>
+            </a:r>
+            <a:br>
+              <a:rPr kumimoji="0" lang="en-US" altLang="en-US" sz="2000" b="0" i="0" u="none" strike="noStrike" cap="none" normalizeH="0" baseline="0" dirty="0" smtClean="0">
+                <a:ln>
+                  <a:noFill/>
+                </a:ln>
+                <a:solidFill>
+                  <a:srgbClr val="E8BF6A"/>
+                </a:solidFill>
+                <a:effectLst/>
+                <a:latin typeface="JetBrains Mono"/>
+              </a:rPr>
+            </a:br>
+            <a:r>
+              <a:rPr kumimoji="0" lang="en-US" altLang="en-US" sz="2000" b="0" i="0" u="none" strike="noStrike" cap="none" normalizeH="0" baseline="0" dirty="0" smtClean="0">
+                <a:ln>
+                  <a:noFill/>
+                </a:ln>
+                <a:solidFill>
+                  <a:srgbClr val="E8BF6A"/>
+                </a:solidFill>
+                <a:effectLst/>
+                <a:latin typeface="JetBrains Mono"/>
+              </a:rPr>
+              <a:t>&lt;/bean&gt;</a:t>
+            </a:r>
+            <a:endParaRPr kumimoji="0" lang="en-US" altLang="en-US" sz="2000" b="0" i="0" u="none" strike="noStrike" cap="none" normalizeH="0" baseline="0" dirty="0" smtClean="0">
+              <a:ln>
+                <a:noFill/>
+              </a:ln>
+              <a:solidFill>
+                <a:schemeClr val="tx1"/>
+              </a:solidFill>
+              <a:effectLst/>
+              <a:latin typeface="Arial" panose="020B0604020202020204" pitchFamily="34" charset="0"/>
+            </a:endParaRPr>
+          </a:p>
+        </p:txBody>
+      </p:sp>
+    </p:spTree>
+    <p:extLst>
+      <p:ext uri="{BB962C8B-B14F-4D97-AF65-F5344CB8AC3E}">
+        <p14:creationId xmlns:p14="http://schemas.microsoft.com/office/powerpoint/2010/main" val="3025374423"/>
       </p:ext>
     </p:extLst>
   </p:cSld>

</xml_diff>

<commit_message>
example 10 presentation was changed, Parrot class was deleted
</commit_message>
<xml_diff>
--- a/presentations/example10.pptx
+++ b/presentations/example10.pptx
@@ -245,7 +245,7 @@
           <a:p>
             <a:fld id="{74A6B15C-ADB0-4957-B33F-4CF21949A72A}" type="datetimeFigureOut">
               <a:rPr lang="en-US" smtClean="0"/>
-              <a:t>5/10/2021</a:t>
+              <a:t>8/3/2021</a:t>
             </a:fld>
             <a:endParaRPr lang="en-US"/>
           </a:p>
@@ -413,7 +413,7 @@
           <a:p>
             <a:fld id="{74A6B15C-ADB0-4957-B33F-4CF21949A72A}" type="datetimeFigureOut">
               <a:rPr lang="en-US" smtClean="0"/>
-              <a:t>5/10/2021</a:t>
+              <a:t>8/3/2021</a:t>
             </a:fld>
             <a:endParaRPr lang="en-US"/>
           </a:p>
@@ -591,7 +591,7 @@
           <a:p>
             <a:fld id="{74A6B15C-ADB0-4957-B33F-4CF21949A72A}" type="datetimeFigureOut">
               <a:rPr lang="en-US" smtClean="0"/>
-              <a:t>5/10/2021</a:t>
+              <a:t>8/3/2021</a:t>
             </a:fld>
             <a:endParaRPr lang="en-US"/>
           </a:p>
@@ -759,7 +759,7 @@
           <a:p>
             <a:fld id="{74A6B15C-ADB0-4957-B33F-4CF21949A72A}" type="datetimeFigureOut">
               <a:rPr lang="en-US" smtClean="0"/>
-              <a:t>5/10/2021</a:t>
+              <a:t>8/3/2021</a:t>
             </a:fld>
             <a:endParaRPr lang="en-US"/>
           </a:p>
@@ -1004,7 +1004,7 @@
           <a:p>
             <a:fld id="{74A6B15C-ADB0-4957-B33F-4CF21949A72A}" type="datetimeFigureOut">
               <a:rPr lang="en-US" smtClean="0"/>
-              <a:t>5/10/2021</a:t>
+              <a:t>8/3/2021</a:t>
             </a:fld>
             <a:endParaRPr lang="en-US"/>
           </a:p>
@@ -1233,7 +1233,7 @@
           <a:p>
             <a:fld id="{74A6B15C-ADB0-4957-B33F-4CF21949A72A}" type="datetimeFigureOut">
               <a:rPr lang="en-US" smtClean="0"/>
-              <a:t>5/10/2021</a:t>
+              <a:t>8/3/2021</a:t>
             </a:fld>
             <a:endParaRPr lang="en-US"/>
           </a:p>
@@ -1597,7 +1597,7 @@
           <a:p>
             <a:fld id="{74A6B15C-ADB0-4957-B33F-4CF21949A72A}" type="datetimeFigureOut">
               <a:rPr lang="en-US" smtClean="0"/>
-              <a:t>5/10/2021</a:t>
+              <a:t>8/3/2021</a:t>
             </a:fld>
             <a:endParaRPr lang="en-US"/>
           </a:p>
@@ -1714,7 +1714,7 @@
           <a:p>
             <a:fld id="{74A6B15C-ADB0-4957-B33F-4CF21949A72A}" type="datetimeFigureOut">
               <a:rPr lang="en-US" smtClean="0"/>
-              <a:t>5/10/2021</a:t>
+              <a:t>8/3/2021</a:t>
             </a:fld>
             <a:endParaRPr lang="en-US"/>
           </a:p>
@@ -1809,7 +1809,7 @@
           <a:p>
             <a:fld id="{74A6B15C-ADB0-4957-B33F-4CF21949A72A}" type="datetimeFigureOut">
               <a:rPr lang="en-US" smtClean="0"/>
-              <a:t>5/10/2021</a:t>
+              <a:t>8/3/2021</a:t>
             </a:fld>
             <a:endParaRPr lang="en-US"/>
           </a:p>
@@ -2084,7 +2084,7 @@
           <a:p>
             <a:fld id="{74A6B15C-ADB0-4957-B33F-4CF21949A72A}" type="datetimeFigureOut">
               <a:rPr lang="en-US" smtClean="0"/>
-              <a:t>5/10/2021</a:t>
+              <a:t>8/3/2021</a:t>
             </a:fld>
             <a:endParaRPr lang="en-US"/>
           </a:p>
@@ -2336,7 +2336,7 @@
           <a:p>
             <a:fld id="{74A6B15C-ADB0-4957-B33F-4CF21949A72A}" type="datetimeFigureOut">
               <a:rPr lang="en-US" smtClean="0"/>
-              <a:t>5/10/2021</a:t>
+              <a:t>8/3/2021</a:t>
             </a:fld>
             <a:endParaRPr lang="en-US"/>
           </a:p>
@@ -2547,7 +2547,7 @@
           <a:p>
             <a:fld id="{74A6B15C-ADB0-4957-B33F-4CF21949A72A}" type="datetimeFigureOut">
               <a:rPr lang="en-US" smtClean="0"/>
-              <a:t>5/10/2021</a:t>
+              <a:t>8/3/2021</a:t>
             </a:fld>
             <a:endParaRPr lang="en-US"/>
           </a:p>
@@ -3142,7 +3142,7 @@
         </p:spPr>
         <p:txBody>
           <a:bodyPr>
-            <a:normAutofit fontScale="92500" lnSpcReduction="10000"/>
+            <a:normAutofit/>
           </a:bodyPr>
           <a:lstStyle/>
           <a:p>
@@ -3325,47 +3325,6 @@
           </a:p>
           <a:p>
             <a:endParaRPr lang="en-US" dirty="0"/>
-          </a:p>
-          <a:p>
-            <a:pPr marL="0" indent="0">
-              <a:buNone/>
-            </a:pPr>
-            <a:r>
-              <a:rPr lang="en-US" dirty="0"/>
-              <a:t>(</a:t>
-            </a:r>
-            <a:r>
-              <a:rPr lang="ru-RU" dirty="0"/>
-              <a:t>зачем </a:t>
-            </a:r>
-            <a:r>
-              <a:rPr lang="en-CA" dirty="0" err="1"/>
-              <a:t>hashCode</a:t>
-            </a:r>
-            <a:r>
-              <a:rPr lang="en-CA" dirty="0"/>
-              <a:t>() </a:t>
-            </a:r>
-            <a:r>
-              <a:rPr lang="ru-RU" dirty="0"/>
-              <a:t>в </a:t>
-            </a:r>
-            <a:r>
-              <a:rPr lang="en-CA" dirty="0"/>
-              <a:t>main?</a:t>
-            </a:r>
-            <a:r>
-              <a:rPr lang="ru-RU" dirty="0"/>
-              <a:t> И зачем попугай, если его нигде не </a:t>
-            </a:r>
-            <a:r>
-              <a:rPr lang="ru-RU" dirty="0" err="1"/>
-              <a:t>юзаем</a:t>
-            </a:r>
-            <a:r>
-              <a:rPr lang="en-US" dirty="0"/>
-              <a:t>)</a:t>
-            </a:r>
           </a:p>
         </p:txBody>
       </p:sp>

</xml_diff>